<commit_message>
ADS Update Update Update (final)
Hopefully this is the last changes.
</commit_message>
<xml_diff>
--- a/Presentations/Team Status Report 9-7-12 (ADS Update).pptx
+++ b/Presentations/Team Status Report 9-7-12 (ADS Update).pptx
@@ -5,7 +5,7 @@
     <p:sldMasterId id="2147483732" r:id="rId1"/>
   </p:sldMasterIdLst>
   <p:notesMasterIdLst>
-    <p:notesMasterId r:id="rId12"/>
+    <p:notesMasterId r:id="rId15"/>
   </p:notesMasterIdLst>
   <p:sldIdLst>
     <p:sldId id="262" r:id="rId2"/>
@@ -13,11 +13,14 @@
     <p:sldId id="299" r:id="rId4"/>
     <p:sldId id="297" r:id="rId5"/>
     <p:sldId id="300" r:id="rId6"/>
-    <p:sldId id="294" r:id="rId7"/>
-    <p:sldId id="298" r:id="rId8"/>
-    <p:sldId id="301" r:id="rId9"/>
-    <p:sldId id="295" r:id="rId10"/>
-    <p:sldId id="296" r:id="rId11"/>
+    <p:sldId id="301" r:id="rId7"/>
+    <p:sldId id="302" r:id="rId8"/>
+    <p:sldId id="304" r:id="rId9"/>
+    <p:sldId id="303" r:id="rId10"/>
+    <p:sldId id="305" r:id="rId11"/>
+    <p:sldId id="306" r:id="rId12"/>
+    <p:sldId id="295" r:id="rId13"/>
+    <p:sldId id="296" r:id="rId14"/>
   </p:sldIdLst>
   <p:sldSz cx="9144000" cy="6858000" type="screen4x3"/>
   <p:notesSz cx="6858000" cy="9144000"/>
@@ -515,6 +518,10 @@
           <a:bodyPr/>
           <a:lstStyle/>
           <a:p>
+            <a:r>
+              <a:rPr lang="en-US" dirty="0" smtClean="0"/>
+              <a:t>Beaver</a:t>
+            </a:r>
             <a:endParaRPr lang="en-US" dirty="0"/>
           </a:p>
         </p:txBody>
@@ -547,6 +554,1074 @@
     <p:extLst>
       <p:ext uri="{BB962C8B-B14F-4D97-AF65-F5344CB8AC3E}">
         <p14:creationId xmlns:p14="http://schemas.microsoft.com/office/powerpoint/2010/main" val="301131134"/>
+      </p:ext>
+    </p:extLst>
+  </p:cSld>
+  <p:clrMapOvr>
+    <a:masterClrMapping/>
+  </p:clrMapOvr>
+</p:notes>
+</file>
+
+<file path=ppt/notesSlides/notesSlide10.xml><?xml version="1.0" encoding="utf-8"?>
+<p:notes xmlns:a="http://schemas.openxmlformats.org/drawingml/2006/main" xmlns:r="http://schemas.openxmlformats.org/officeDocument/2006/relationships" xmlns:p="http://schemas.openxmlformats.org/presentationml/2006/main">
+  <p:cSld>
+    <p:spTree>
+      <p:nvGrpSpPr>
+        <p:cNvPr id="1" name=""/>
+        <p:cNvGrpSpPr/>
+        <p:nvPr/>
+      </p:nvGrpSpPr>
+      <p:grpSpPr>
+        <a:xfrm>
+          <a:off x="0" y="0"/>
+          <a:ext cx="0" cy="0"/>
+          <a:chOff x="0" y="0"/>
+          <a:chExt cx="0" cy="0"/>
+        </a:xfrm>
+      </p:grpSpPr>
+      <p:sp>
+        <p:nvSpPr>
+          <p:cNvPr id="2" name="Slide Image Placeholder 1"/>
+          <p:cNvSpPr>
+            <a:spLocks noGrp="1" noRot="1" noChangeAspect="1"/>
+          </p:cNvSpPr>
+          <p:nvPr>
+            <p:ph type="sldImg"/>
+          </p:nvPr>
+        </p:nvSpPr>
+        <p:spPr/>
+      </p:sp>
+      <p:sp>
+        <p:nvSpPr>
+          <p:cNvPr id="3" name="Notes Placeholder 2"/>
+          <p:cNvSpPr>
+            <a:spLocks noGrp="1"/>
+          </p:cNvSpPr>
+          <p:nvPr>
+            <p:ph type="body" idx="1"/>
+          </p:nvPr>
+        </p:nvSpPr>
+        <p:spPr/>
+        <p:txBody>
+          <a:bodyPr/>
+          <a:lstStyle/>
+          <a:p>
+            <a:r>
+              <a:rPr lang="en-US" dirty="0" smtClean="0"/>
+              <a:t>Penny</a:t>
+            </a:r>
+            <a:endParaRPr lang="en-US" dirty="0"/>
+          </a:p>
+        </p:txBody>
+      </p:sp>
+      <p:sp>
+        <p:nvSpPr>
+          <p:cNvPr id="4" name="Slide Number Placeholder 3"/>
+          <p:cNvSpPr>
+            <a:spLocks noGrp="1"/>
+          </p:cNvSpPr>
+          <p:nvPr>
+            <p:ph type="sldNum" sz="quarter" idx="10"/>
+          </p:nvPr>
+        </p:nvSpPr>
+        <p:spPr/>
+        <p:txBody>
+          <a:bodyPr/>
+          <a:lstStyle/>
+          <a:p>
+            <a:fld id="{165BAAFA-8569-4F3A-B5A8-377F352D7750}" type="slidenum">
+              <a:rPr lang="en-US" smtClean="0"/>
+              <a:pPr/>
+              <a:t>10</a:t>
+            </a:fld>
+            <a:endParaRPr lang="en-US"/>
+          </a:p>
+        </p:txBody>
+      </p:sp>
+    </p:spTree>
+    <p:extLst>
+      <p:ext uri="{BB962C8B-B14F-4D97-AF65-F5344CB8AC3E}">
+        <p14:creationId xmlns:p14="http://schemas.microsoft.com/office/powerpoint/2010/main" val="2590022523"/>
+      </p:ext>
+    </p:extLst>
+  </p:cSld>
+  <p:clrMapOvr>
+    <a:masterClrMapping/>
+  </p:clrMapOvr>
+</p:notes>
+</file>
+
+<file path=ppt/notesSlides/notesSlide11.xml><?xml version="1.0" encoding="utf-8"?>
+<p:notes xmlns:a="http://schemas.openxmlformats.org/drawingml/2006/main" xmlns:r="http://schemas.openxmlformats.org/officeDocument/2006/relationships" xmlns:p="http://schemas.openxmlformats.org/presentationml/2006/main">
+  <p:cSld>
+    <p:spTree>
+      <p:nvGrpSpPr>
+        <p:cNvPr id="1" name=""/>
+        <p:cNvGrpSpPr/>
+        <p:nvPr/>
+      </p:nvGrpSpPr>
+      <p:grpSpPr>
+        <a:xfrm>
+          <a:off x="0" y="0"/>
+          <a:ext cx="0" cy="0"/>
+          <a:chOff x="0" y="0"/>
+          <a:chExt cx="0" cy="0"/>
+        </a:xfrm>
+      </p:grpSpPr>
+      <p:sp>
+        <p:nvSpPr>
+          <p:cNvPr id="2" name="Slide Image Placeholder 1"/>
+          <p:cNvSpPr>
+            <a:spLocks noGrp="1" noRot="1" noChangeAspect="1"/>
+          </p:cNvSpPr>
+          <p:nvPr>
+            <p:ph type="sldImg"/>
+          </p:nvPr>
+        </p:nvSpPr>
+        <p:spPr/>
+      </p:sp>
+      <p:sp>
+        <p:nvSpPr>
+          <p:cNvPr id="3" name="Notes Placeholder 2"/>
+          <p:cNvSpPr>
+            <a:spLocks noGrp="1"/>
+          </p:cNvSpPr>
+          <p:nvPr>
+            <p:ph type="body" idx="1"/>
+          </p:nvPr>
+        </p:nvSpPr>
+        <p:spPr/>
+        <p:txBody>
+          <a:bodyPr/>
+          <a:lstStyle/>
+          <a:p>
+            <a:r>
+              <a:rPr lang="en-US" dirty="0" smtClean="0"/>
+              <a:t>Penny</a:t>
+            </a:r>
+            <a:endParaRPr lang="en-US" dirty="0"/>
+          </a:p>
+        </p:txBody>
+      </p:sp>
+      <p:sp>
+        <p:nvSpPr>
+          <p:cNvPr id="4" name="Slide Number Placeholder 3"/>
+          <p:cNvSpPr>
+            <a:spLocks noGrp="1"/>
+          </p:cNvSpPr>
+          <p:nvPr>
+            <p:ph type="sldNum" sz="quarter" idx="10"/>
+          </p:nvPr>
+        </p:nvSpPr>
+        <p:spPr/>
+        <p:txBody>
+          <a:bodyPr/>
+          <a:lstStyle/>
+          <a:p>
+            <a:fld id="{165BAAFA-8569-4F3A-B5A8-377F352D7750}" type="slidenum">
+              <a:rPr lang="en-US" smtClean="0"/>
+              <a:pPr/>
+              <a:t>11</a:t>
+            </a:fld>
+            <a:endParaRPr lang="en-US"/>
+          </a:p>
+        </p:txBody>
+      </p:sp>
+    </p:spTree>
+    <p:extLst>
+      <p:ext uri="{BB962C8B-B14F-4D97-AF65-F5344CB8AC3E}">
+        <p14:creationId xmlns:p14="http://schemas.microsoft.com/office/powerpoint/2010/main" val="163451898"/>
+      </p:ext>
+    </p:extLst>
+  </p:cSld>
+  <p:clrMapOvr>
+    <a:masterClrMapping/>
+  </p:clrMapOvr>
+</p:notes>
+</file>
+
+<file path=ppt/notesSlides/notesSlide12.xml><?xml version="1.0" encoding="utf-8"?>
+<p:notes xmlns:a="http://schemas.openxmlformats.org/drawingml/2006/main" xmlns:r="http://schemas.openxmlformats.org/officeDocument/2006/relationships" xmlns:p="http://schemas.openxmlformats.org/presentationml/2006/main">
+  <p:cSld>
+    <p:spTree>
+      <p:nvGrpSpPr>
+        <p:cNvPr id="1" name=""/>
+        <p:cNvGrpSpPr/>
+        <p:nvPr/>
+      </p:nvGrpSpPr>
+      <p:grpSpPr>
+        <a:xfrm>
+          <a:off x="0" y="0"/>
+          <a:ext cx="0" cy="0"/>
+          <a:chOff x="0" y="0"/>
+          <a:chExt cx="0" cy="0"/>
+        </a:xfrm>
+      </p:grpSpPr>
+      <p:sp>
+        <p:nvSpPr>
+          <p:cNvPr id="2" name="Slide Image Placeholder 1"/>
+          <p:cNvSpPr>
+            <a:spLocks noGrp="1" noRot="1" noChangeAspect="1"/>
+          </p:cNvSpPr>
+          <p:nvPr>
+            <p:ph type="sldImg"/>
+          </p:nvPr>
+        </p:nvSpPr>
+        <p:spPr/>
+      </p:sp>
+      <p:sp>
+        <p:nvSpPr>
+          <p:cNvPr id="3" name="Notes Placeholder 2"/>
+          <p:cNvSpPr>
+            <a:spLocks noGrp="1"/>
+          </p:cNvSpPr>
+          <p:nvPr>
+            <p:ph type="body" idx="1"/>
+          </p:nvPr>
+        </p:nvSpPr>
+        <p:spPr/>
+        <p:txBody>
+          <a:bodyPr/>
+          <a:lstStyle/>
+          <a:p>
+            <a:r>
+              <a:rPr lang="en-US" dirty="0" smtClean="0"/>
+              <a:t>Bandit</a:t>
+            </a:r>
+            <a:endParaRPr lang="en-US" dirty="0"/>
+          </a:p>
+        </p:txBody>
+      </p:sp>
+      <p:sp>
+        <p:nvSpPr>
+          <p:cNvPr id="4" name="Slide Number Placeholder 3"/>
+          <p:cNvSpPr>
+            <a:spLocks noGrp="1"/>
+          </p:cNvSpPr>
+          <p:nvPr>
+            <p:ph type="sldNum" sz="quarter" idx="10"/>
+          </p:nvPr>
+        </p:nvSpPr>
+        <p:spPr/>
+        <p:txBody>
+          <a:bodyPr/>
+          <a:lstStyle/>
+          <a:p>
+            <a:fld id="{165BAAFA-8569-4F3A-B5A8-377F352D7750}" type="slidenum">
+              <a:rPr lang="en-US" smtClean="0"/>
+              <a:pPr/>
+              <a:t>12</a:t>
+            </a:fld>
+            <a:endParaRPr lang="en-US"/>
+          </a:p>
+        </p:txBody>
+      </p:sp>
+    </p:spTree>
+    <p:extLst>
+      <p:ext uri="{BB962C8B-B14F-4D97-AF65-F5344CB8AC3E}">
+        <p14:creationId xmlns:p14="http://schemas.microsoft.com/office/powerpoint/2010/main" val="3449171246"/>
+      </p:ext>
+    </p:extLst>
+  </p:cSld>
+  <p:clrMapOvr>
+    <a:masterClrMapping/>
+  </p:clrMapOvr>
+</p:notes>
+</file>
+
+<file path=ppt/notesSlides/notesSlide13.xml><?xml version="1.0" encoding="utf-8"?>
+<p:notes xmlns:a="http://schemas.openxmlformats.org/drawingml/2006/main" xmlns:r="http://schemas.openxmlformats.org/officeDocument/2006/relationships" xmlns:p="http://schemas.openxmlformats.org/presentationml/2006/main">
+  <p:cSld>
+    <p:spTree>
+      <p:nvGrpSpPr>
+        <p:cNvPr id="1" name=""/>
+        <p:cNvGrpSpPr/>
+        <p:nvPr/>
+      </p:nvGrpSpPr>
+      <p:grpSpPr>
+        <a:xfrm>
+          <a:off x="0" y="0"/>
+          <a:ext cx="0" cy="0"/>
+          <a:chOff x="0" y="0"/>
+          <a:chExt cx="0" cy="0"/>
+        </a:xfrm>
+      </p:grpSpPr>
+      <p:sp>
+        <p:nvSpPr>
+          <p:cNvPr id="2" name="Slide Image Placeholder 1"/>
+          <p:cNvSpPr>
+            <a:spLocks noGrp="1" noRot="1" noChangeAspect="1"/>
+          </p:cNvSpPr>
+          <p:nvPr>
+            <p:ph type="sldImg"/>
+          </p:nvPr>
+        </p:nvSpPr>
+        <p:spPr/>
+      </p:sp>
+      <p:sp>
+        <p:nvSpPr>
+          <p:cNvPr id="3" name="Notes Placeholder 2"/>
+          <p:cNvSpPr>
+            <a:spLocks noGrp="1"/>
+          </p:cNvSpPr>
+          <p:nvPr>
+            <p:ph type="body" idx="1"/>
+          </p:nvPr>
+        </p:nvSpPr>
+        <p:spPr/>
+        <p:txBody>
+          <a:bodyPr/>
+          <a:lstStyle/>
+          <a:p>
+            <a:r>
+              <a:rPr lang="en-US" dirty="0" smtClean="0"/>
+              <a:t>Bandit</a:t>
+            </a:r>
+            <a:endParaRPr lang="en-US" dirty="0"/>
+          </a:p>
+        </p:txBody>
+      </p:sp>
+      <p:sp>
+        <p:nvSpPr>
+          <p:cNvPr id="4" name="Slide Number Placeholder 3"/>
+          <p:cNvSpPr>
+            <a:spLocks noGrp="1"/>
+          </p:cNvSpPr>
+          <p:nvPr>
+            <p:ph type="sldNum" sz="quarter" idx="10"/>
+          </p:nvPr>
+        </p:nvSpPr>
+        <p:spPr/>
+        <p:txBody>
+          <a:bodyPr/>
+          <a:lstStyle/>
+          <a:p>
+            <a:fld id="{165BAAFA-8569-4F3A-B5A8-377F352D7750}" type="slidenum">
+              <a:rPr lang="en-US" smtClean="0"/>
+              <a:pPr/>
+              <a:t>13</a:t>
+            </a:fld>
+            <a:endParaRPr lang="en-US"/>
+          </a:p>
+        </p:txBody>
+      </p:sp>
+    </p:spTree>
+    <p:extLst>
+      <p:ext uri="{BB962C8B-B14F-4D97-AF65-F5344CB8AC3E}">
+        <p14:creationId xmlns:p14="http://schemas.microsoft.com/office/powerpoint/2010/main" val="2335350492"/>
+      </p:ext>
+    </p:extLst>
+  </p:cSld>
+  <p:clrMapOvr>
+    <a:masterClrMapping/>
+  </p:clrMapOvr>
+</p:notes>
+</file>
+
+<file path=ppt/notesSlides/notesSlide2.xml><?xml version="1.0" encoding="utf-8"?>
+<p:notes xmlns:a="http://schemas.openxmlformats.org/drawingml/2006/main" xmlns:r="http://schemas.openxmlformats.org/officeDocument/2006/relationships" xmlns:p="http://schemas.openxmlformats.org/presentationml/2006/main">
+  <p:cSld>
+    <p:spTree>
+      <p:nvGrpSpPr>
+        <p:cNvPr id="1" name=""/>
+        <p:cNvGrpSpPr/>
+        <p:nvPr/>
+      </p:nvGrpSpPr>
+      <p:grpSpPr>
+        <a:xfrm>
+          <a:off x="0" y="0"/>
+          <a:ext cx="0" cy="0"/>
+          <a:chOff x="0" y="0"/>
+          <a:chExt cx="0" cy="0"/>
+        </a:xfrm>
+      </p:grpSpPr>
+      <p:sp>
+        <p:nvSpPr>
+          <p:cNvPr id="2" name="Slide Image Placeholder 1"/>
+          <p:cNvSpPr>
+            <a:spLocks noGrp="1" noRot="1" noChangeAspect="1"/>
+          </p:cNvSpPr>
+          <p:nvPr>
+            <p:ph type="sldImg"/>
+          </p:nvPr>
+        </p:nvSpPr>
+        <p:spPr/>
+      </p:sp>
+      <p:sp>
+        <p:nvSpPr>
+          <p:cNvPr id="3" name="Notes Placeholder 2"/>
+          <p:cNvSpPr>
+            <a:spLocks noGrp="1"/>
+          </p:cNvSpPr>
+          <p:nvPr>
+            <p:ph type="body" idx="1"/>
+          </p:nvPr>
+        </p:nvSpPr>
+        <p:spPr/>
+        <p:txBody>
+          <a:bodyPr/>
+          <a:lstStyle/>
+          <a:p>
+            <a:r>
+              <a:rPr lang="en-US" dirty="0" smtClean="0"/>
+              <a:t>Beaver</a:t>
+            </a:r>
+            <a:endParaRPr lang="en-US" dirty="0"/>
+          </a:p>
+        </p:txBody>
+      </p:sp>
+      <p:sp>
+        <p:nvSpPr>
+          <p:cNvPr id="4" name="Slide Number Placeholder 3"/>
+          <p:cNvSpPr>
+            <a:spLocks noGrp="1"/>
+          </p:cNvSpPr>
+          <p:nvPr>
+            <p:ph type="sldNum" sz="quarter" idx="10"/>
+          </p:nvPr>
+        </p:nvSpPr>
+        <p:spPr/>
+        <p:txBody>
+          <a:bodyPr/>
+          <a:lstStyle/>
+          <a:p>
+            <a:fld id="{165BAAFA-8569-4F3A-B5A8-377F352D7750}" type="slidenum">
+              <a:rPr lang="en-US" smtClean="0"/>
+              <a:pPr/>
+              <a:t>2</a:t>
+            </a:fld>
+            <a:endParaRPr lang="en-US"/>
+          </a:p>
+        </p:txBody>
+      </p:sp>
+    </p:spTree>
+    <p:extLst>
+      <p:ext uri="{BB962C8B-B14F-4D97-AF65-F5344CB8AC3E}">
+        <p14:creationId xmlns:p14="http://schemas.microsoft.com/office/powerpoint/2010/main" val="3689718278"/>
+      </p:ext>
+    </p:extLst>
+  </p:cSld>
+  <p:clrMapOvr>
+    <a:masterClrMapping/>
+  </p:clrMapOvr>
+</p:notes>
+</file>
+
+<file path=ppt/notesSlides/notesSlide3.xml><?xml version="1.0" encoding="utf-8"?>
+<p:notes xmlns:a="http://schemas.openxmlformats.org/drawingml/2006/main" xmlns:r="http://schemas.openxmlformats.org/officeDocument/2006/relationships" xmlns:p="http://schemas.openxmlformats.org/presentationml/2006/main">
+  <p:cSld>
+    <p:spTree>
+      <p:nvGrpSpPr>
+        <p:cNvPr id="1" name=""/>
+        <p:cNvGrpSpPr/>
+        <p:nvPr/>
+      </p:nvGrpSpPr>
+      <p:grpSpPr>
+        <a:xfrm>
+          <a:off x="0" y="0"/>
+          <a:ext cx="0" cy="0"/>
+          <a:chOff x="0" y="0"/>
+          <a:chExt cx="0" cy="0"/>
+        </a:xfrm>
+      </p:grpSpPr>
+      <p:sp>
+        <p:nvSpPr>
+          <p:cNvPr id="2" name="Slide Image Placeholder 1"/>
+          <p:cNvSpPr>
+            <a:spLocks noGrp="1" noRot="1" noChangeAspect="1"/>
+          </p:cNvSpPr>
+          <p:nvPr>
+            <p:ph type="sldImg"/>
+          </p:nvPr>
+        </p:nvSpPr>
+        <p:spPr/>
+      </p:sp>
+      <p:sp>
+        <p:nvSpPr>
+          <p:cNvPr id="3" name="Notes Placeholder 2"/>
+          <p:cNvSpPr>
+            <a:spLocks noGrp="1"/>
+          </p:cNvSpPr>
+          <p:nvPr>
+            <p:ph type="body" idx="1"/>
+          </p:nvPr>
+        </p:nvSpPr>
+        <p:spPr/>
+        <p:txBody>
+          <a:bodyPr/>
+          <a:lstStyle/>
+          <a:p>
+            <a:r>
+              <a:rPr lang="en-US" dirty="0" smtClean="0"/>
+              <a:t>Beaver</a:t>
+            </a:r>
+            <a:endParaRPr lang="en-US" dirty="0"/>
+          </a:p>
+        </p:txBody>
+      </p:sp>
+      <p:sp>
+        <p:nvSpPr>
+          <p:cNvPr id="4" name="Slide Number Placeholder 3"/>
+          <p:cNvSpPr>
+            <a:spLocks noGrp="1"/>
+          </p:cNvSpPr>
+          <p:nvPr>
+            <p:ph type="sldNum" sz="quarter" idx="10"/>
+          </p:nvPr>
+        </p:nvSpPr>
+        <p:spPr/>
+        <p:txBody>
+          <a:bodyPr/>
+          <a:lstStyle/>
+          <a:p>
+            <a:fld id="{165BAAFA-8569-4F3A-B5A8-377F352D7750}" type="slidenum">
+              <a:rPr lang="en-US" smtClean="0"/>
+              <a:pPr/>
+              <a:t>3</a:t>
+            </a:fld>
+            <a:endParaRPr lang="en-US"/>
+          </a:p>
+        </p:txBody>
+      </p:sp>
+    </p:spTree>
+    <p:extLst>
+      <p:ext uri="{BB962C8B-B14F-4D97-AF65-F5344CB8AC3E}">
+        <p14:creationId xmlns:p14="http://schemas.microsoft.com/office/powerpoint/2010/main" val="3339510899"/>
+      </p:ext>
+    </p:extLst>
+  </p:cSld>
+  <p:clrMapOvr>
+    <a:masterClrMapping/>
+  </p:clrMapOvr>
+</p:notes>
+</file>
+
+<file path=ppt/notesSlides/notesSlide4.xml><?xml version="1.0" encoding="utf-8"?>
+<p:notes xmlns:a="http://schemas.openxmlformats.org/drawingml/2006/main" xmlns:r="http://schemas.openxmlformats.org/officeDocument/2006/relationships" xmlns:p="http://schemas.openxmlformats.org/presentationml/2006/main">
+  <p:cSld>
+    <p:spTree>
+      <p:nvGrpSpPr>
+        <p:cNvPr id="1" name=""/>
+        <p:cNvGrpSpPr/>
+        <p:nvPr/>
+      </p:nvGrpSpPr>
+      <p:grpSpPr>
+        <a:xfrm>
+          <a:off x="0" y="0"/>
+          <a:ext cx="0" cy="0"/>
+          <a:chOff x="0" y="0"/>
+          <a:chExt cx="0" cy="0"/>
+        </a:xfrm>
+      </p:grpSpPr>
+      <p:sp>
+        <p:nvSpPr>
+          <p:cNvPr id="2" name="Slide Image Placeholder 1"/>
+          <p:cNvSpPr>
+            <a:spLocks noGrp="1" noRot="1" noChangeAspect="1"/>
+          </p:cNvSpPr>
+          <p:nvPr>
+            <p:ph type="sldImg"/>
+          </p:nvPr>
+        </p:nvSpPr>
+        <p:spPr/>
+      </p:sp>
+      <p:sp>
+        <p:nvSpPr>
+          <p:cNvPr id="3" name="Notes Placeholder 2"/>
+          <p:cNvSpPr>
+            <a:spLocks noGrp="1"/>
+          </p:cNvSpPr>
+          <p:nvPr>
+            <p:ph type="body" idx="1"/>
+          </p:nvPr>
+        </p:nvSpPr>
+        <p:spPr/>
+        <p:txBody>
+          <a:bodyPr/>
+          <a:lstStyle/>
+          <a:p>
+            <a:r>
+              <a:rPr lang="en-US" dirty="0" smtClean="0"/>
+              <a:t>Beaver</a:t>
+            </a:r>
+            <a:endParaRPr lang="en-US" dirty="0"/>
+          </a:p>
+        </p:txBody>
+      </p:sp>
+      <p:sp>
+        <p:nvSpPr>
+          <p:cNvPr id="4" name="Slide Number Placeholder 3"/>
+          <p:cNvSpPr>
+            <a:spLocks noGrp="1"/>
+          </p:cNvSpPr>
+          <p:nvPr>
+            <p:ph type="sldNum" sz="quarter" idx="10"/>
+          </p:nvPr>
+        </p:nvSpPr>
+        <p:spPr/>
+        <p:txBody>
+          <a:bodyPr/>
+          <a:lstStyle/>
+          <a:p>
+            <a:fld id="{165BAAFA-8569-4F3A-B5A8-377F352D7750}" type="slidenum">
+              <a:rPr lang="en-US" smtClean="0"/>
+              <a:pPr/>
+              <a:t>4</a:t>
+            </a:fld>
+            <a:endParaRPr lang="en-US"/>
+          </a:p>
+        </p:txBody>
+      </p:sp>
+    </p:spTree>
+    <p:extLst>
+      <p:ext uri="{BB962C8B-B14F-4D97-AF65-F5344CB8AC3E}">
+        <p14:creationId xmlns:p14="http://schemas.microsoft.com/office/powerpoint/2010/main" val="3269861083"/>
+      </p:ext>
+    </p:extLst>
+  </p:cSld>
+  <p:clrMapOvr>
+    <a:masterClrMapping/>
+  </p:clrMapOvr>
+</p:notes>
+</file>
+
+<file path=ppt/notesSlides/notesSlide5.xml><?xml version="1.0" encoding="utf-8"?>
+<p:notes xmlns:a="http://schemas.openxmlformats.org/drawingml/2006/main" xmlns:r="http://schemas.openxmlformats.org/officeDocument/2006/relationships" xmlns:p="http://schemas.openxmlformats.org/presentationml/2006/main">
+  <p:cSld>
+    <p:spTree>
+      <p:nvGrpSpPr>
+        <p:cNvPr id="1" name=""/>
+        <p:cNvGrpSpPr/>
+        <p:nvPr/>
+      </p:nvGrpSpPr>
+      <p:grpSpPr>
+        <a:xfrm>
+          <a:off x="0" y="0"/>
+          <a:ext cx="0" cy="0"/>
+          <a:chOff x="0" y="0"/>
+          <a:chExt cx="0" cy="0"/>
+        </a:xfrm>
+      </p:grpSpPr>
+      <p:sp>
+        <p:nvSpPr>
+          <p:cNvPr id="2" name="Slide Image Placeholder 1"/>
+          <p:cNvSpPr>
+            <a:spLocks noGrp="1" noRot="1" noChangeAspect="1"/>
+          </p:cNvSpPr>
+          <p:nvPr>
+            <p:ph type="sldImg"/>
+          </p:nvPr>
+        </p:nvSpPr>
+        <p:spPr/>
+      </p:sp>
+      <p:sp>
+        <p:nvSpPr>
+          <p:cNvPr id="3" name="Notes Placeholder 2"/>
+          <p:cNvSpPr>
+            <a:spLocks noGrp="1"/>
+          </p:cNvSpPr>
+          <p:nvPr>
+            <p:ph type="body" idx="1"/>
+          </p:nvPr>
+        </p:nvSpPr>
+        <p:spPr/>
+        <p:txBody>
+          <a:bodyPr/>
+          <a:lstStyle/>
+          <a:p>
+            <a:r>
+              <a:rPr lang="en-US" dirty="0" smtClean="0"/>
+              <a:t>Beaver</a:t>
+            </a:r>
+            <a:endParaRPr lang="en-US" dirty="0"/>
+          </a:p>
+        </p:txBody>
+      </p:sp>
+      <p:sp>
+        <p:nvSpPr>
+          <p:cNvPr id="4" name="Slide Number Placeholder 3"/>
+          <p:cNvSpPr>
+            <a:spLocks noGrp="1"/>
+          </p:cNvSpPr>
+          <p:nvPr>
+            <p:ph type="sldNum" sz="quarter" idx="10"/>
+          </p:nvPr>
+        </p:nvSpPr>
+        <p:spPr/>
+        <p:txBody>
+          <a:bodyPr/>
+          <a:lstStyle/>
+          <a:p>
+            <a:fld id="{165BAAFA-8569-4F3A-B5A8-377F352D7750}" type="slidenum">
+              <a:rPr lang="en-US" smtClean="0"/>
+              <a:pPr/>
+              <a:t>5</a:t>
+            </a:fld>
+            <a:endParaRPr lang="en-US"/>
+          </a:p>
+        </p:txBody>
+      </p:sp>
+    </p:spTree>
+    <p:extLst>
+      <p:ext uri="{BB962C8B-B14F-4D97-AF65-F5344CB8AC3E}">
+        <p14:creationId xmlns:p14="http://schemas.microsoft.com/office/powerpoint/2010/main" val="2930342728"/>
+      </p:ext>
+    </p:extLst>
+  </p:cSld>
+  <p:clrMapOvr>
+    <a:masterClrMapping/>
+  </p:clrMapOvr>
+</p:notes>
+</file>
+
+<file path=ppt/notesSlides/notesSlide6.xml><?xml version="1.0" encoding="utf-8"?>
+<p:notes xmlns:a="http://schemas.openxmlformats.org/drawingml/2006/main" xmlns:r="http://schemas.openxmlformats.org/officeDocument/2006/relationships" xmlns:p="http://schemas.openxmlformats.org/presentationml/2006/main">
+  <p:cSld>
+    <p:spTree>
+      <p:nvGrpSpPr>
+        <p:cNvPr id="1" name=""/>
+        <p:cNvGrpSpPr/>
+        <p:nvPr/>
+      </p:nvGrpSpPr>
+      <p:grpSpPr>
+        <a:xfrm>
+          <a:off x="0" y="0"/>
+          <a:ext cx="0" cy="0"/>
+          <a:chOff x="0" y="0"/>
+          <a:chExt cx="0" cy="0"/>
+        </a:xfrm>
+      </p:grpSpPr>
+      <p:sp>
+        <p:nvSpPr>
+          <p:cNvPr id="2" name="Slide Image Placeholder 1"/>
+          <p:cNvSpPr>
+            <a:spLocks noGrp="1" noRot="1" noChangeAspect="1"/>
+          </p:cNvSpPr>
+          <p:nvPr>
+            <p:ph type="sldImg"/>
+          </p:nvPr>
+        </p:nvSpPr>
+        <p:spPr/>
+      </p:sp>
+      <p:sp>
+        <p:nvSpPr>
+          <p:cNvPr id="3" name="Notes Placeholder 2"/>
+          <p:cNvSpPr>
+            <a:spLocks noGrp="1"/>
+          </p:cNvSpPr>
+          <p:nvPr>
+            <p:ph type="body" idx="1"/>
+          </p:nvPr>
+        </p:nvSpPr>
+        <p:spPr/>
+        <p:txBody>
+          <a:bodyPr/>
+          <a:lstStyle/>
+          <a:p>
+            <a:r>
+              <a:rPr lang="en-US" dirty="0" smtClean="0"/>
+              <a:t>Dawg</a:t>
+            </a:r>
+            <a:endParaRPr lang="en-US" dirty="0"/>
+          </a:p>
+        </p:txBody>
+      </p:sp>
+      <p:sp>
+        <p:nvSpPr>
+          <p:cNvPr id="4" name="Slide Number Placeholder 3"/>
+          <p:cNvSpPr>
+            <a:spLocks noGrp="1"/>
+          </p:cNvSpPr>
+          <p:nvPr>
+            <p:ph type="sldNum" sz="quarter" idx="10"/>
+          </p:nvPr>
+        </p:nvSpPr>
+        <p:spPr/>
+        <p:txBody>
+          <a:bodyPr/>
+          <a:lstStyle/>
+          <a:p>
+            <a:fld id="{165BAAFA-8569-4F3A-B5A8-377F352D7750}" type="slidenum">
+              <a:rPr lang="en-US" smtClean="0"/>
+              <a:pPr/>
+              <a:t>6</a:t>
+            </a:fld>
+            <a:endParaRPr lang="en-US"/>
+          </a:p>
+        </p:txBody>
+      </p:sp>
+    </p:spTree>
+    <p:extLst>
+      <p:ext uri="{BB962C8B-B14F-4D97-AF65-F5344CB8AC3E}">
+        <p14:creationId xmlns:p14="http://schemas.microsoft.com/office/powerpoint/2010/main" val="1825466752"/>
+      </p:ext>
+    </p:extLst>
+  </p:cSld>
+  <p:clrMapOvr>
+    <a:masterClrMapping/>
+  </p:clrMapOvr>
+</p:notes>
+</file>
+
+<file path=ppt/notesSlides/notesSlide7.xml><?xml version="1.0" encoding="utf-8"?>
+<p:notes xmlns:a="http://schemas.openxmlformats.org/drawingml/2006/main" xmlns:r="http://schemas.openxmlformats.org/officeDocument/2006/relationships" xmlns:p="http://schemas.openxmlformats.org/presentationml/2006/main">
+  <p:cSld>
+    <p:spTree>
+      <p:nvGrpSpPr>
+        <p:cNvPr id="1" name=""/>
+        <p:cNvGrpSpPr/>
+        <p:nvPr/>
+      </p:nvGrpSpPr>
+      <p:grpSpPr>
+        <a:xfrm>
+          <a:off x="0" y="0"/>
+          <a:ext cx="0" cy="0"/>
+          <a:chOff x="0" y="0"/>
+          <a:chExt cx="0" cy="0"/>
+        </a:xfrm>
+      </p:grpSpPr>
+      <p:sp>
+        <p:nvSpPr>
+          <p:cNvPr id="2" name="Slide Image Placeholder 1"/>
+          <p:cNvSpPr>
+            <a:spLocks noGrp="1" noRot="1" noChangeAspect="1"/>
+          </p:cNvSpPr>
+          <p:nvPr>
+            <p:ph type="sldImg"/>
+          </p:nvPr>
+        </p:nvSpPr>
+        <p:spPr/>
+      </p:sp>
+      <p:sp>
+        <p:nvSpPr>
+          <p:cNvPr id="3" name="Notes Placeholder 2"/>
+          <p:cNvSpPr>
+            <a:spLocks noGrp="1"/>
+          </p:cNvSpPr>
+          <p:nvPr>
+            <p:ph type="body" idx="1"/>
+          </p:nvPr>
+        </p:nvSpPr>
+        <p:spPr/>
+        <p:txBody>
+          <a:bodyPr/>
+          <a:lstStyle/>
+          <a:p>
+            <a:r>
+              <a:rPr lang="en-US" dirty="0" smtClean="0"/>
+              <a:t>Dawg</a:t>
+            </a:r>
+            <a:endParaRPr lang="en-US" dirty="0"/>
+          </a:p>
+        </p:txBody>
+      </p:sp>
+      <p:sp>
+        <p:nvSpPr>
+          <p:cNvPr id="4" name="Slide Number Placeholder 3"/>
+          <p:cNvSpPr>
+            <a:spLocks noGrp="1"/>
+          </p:cNvSpPr>
+          <p:nvPr>
+            <p:ph type="sldNum" sz="quarter" idx="10"/>
+          </p:nvPr>
+        </p:nvSpPr>
+        <p:spPr/>
+        <p:txBody>
+          <a:bodyPr/>
+          <a:lstStyle/>
+          <a:p>
+            <a:fld id="{165BAAFA-8569-4F3A-B5A8-377F352D7750}" type="slidenum">
+              <a:rPr lang="en-US" smtClean="0"/>
+              <a:pPr/>
+              <a:t>7</a:t>
+            </a:fld>
+            <a:endParaRPr lang="en-US"/>
+          </a:p>
+        </p:txBody>
+      </p:sp>
+    </p:spTree>
+    <p:extLst>
+      <p:ext uri="{BB962C8B-B14F-4D97-AF65-F5344CB8AC3E}">
+        <p14:creationId xmlns:p14="http://schemas.microsoft.com/office/powerpoint/2010/main" val="3158567847"/>
+      </p:ext>
+    </p:extLst>
+  </p:cSld>
+  <p:clrMapOvr>
+    <a:masterClrMapping/>
+  </p:clrMapOvr>
+</p:notes>
+</file>
+
+<file path=ppt/notesSlides/notesSlide8.xml><?xml version="1.0" encoding="utf-8"?>
+<p:notes xmlns:a="http://schemas.openxmlformats.org/drawingml/2006/main" xmlns:r="http://schemas.openxmlformats.org/officeDocument/2006/relationships" xmlns:p="http://schemas.openxmlformats.org/presentationml/2006/main">
+  <p:cSld>
+    <p:spTree>
+      <p:nvGrpSpPr>
+        <p:cNvPr id="1" name=""/>
+        <p:cNvGrpSpPr/>
+        <p:nvPr/>
+      </p:nvGrpSpPr>
+      <p:grpSpPr>
+        <a:xfrm>
+          <a:off x="0" y="0"/>
+          <a:ext cx="0" cy="0"/>
+          <a:chOff x="0" y="0"/>
+          <a:chExt cx="0" cy="0"/>
+        </a:xfrm>
+      </p:grpSpPr>
+      <p:sp>
+        <p:nvSpPr>
+          <p:cNvPr id="2" name="Slide Image Placeholder 1"/>
+          <p:cNvSpPr>
+            <a:spLocks noGrp="1" noRot="1" noChangeAspect="1"/>
+          </p:cNvSpPr>
+          <p:nvPr>
+            <p:ph type="sldImg"/>
+          </p:nvPr>
+        </p:nvSpPr>
+        <p:spPr/>
+      </p:sp>
+      <p:sp>
+        <p:nvSpPr>
+          <p:cNvPr id="3" name="Notes Placeholder 2"/>
+          <p:cNvSpPr>
+            <a:spLocks noGrp="1"/>
+          </p:cNvSpPr>
+          <p:nvPr>
+            <p:ph type="body" idx="1"/>
+          </p:nvPr>
+        </p:nvSpPr>
+        <p:spPr/>
+        <p:txBody>
+          <a:bodyPr/>
+          <a:lstStyle/>
+          <a:p>
+            <a:r>
+              <a:rPr lang="en-US" dirty="0" smtClean="0"/>
+              <a:t>Dawg</a:t>
+            </a:r>
+            <a:endParaRPr lang="en-US" dirty="0"/>
+          </a:p>
+        </p:txBody>
+      </p:sp>
+      <p:sp>
+        <p:nvSpPr>
+          <p:cNvPr id="4" name="Slide Number Placeholder 3"/>
+          <p:cNvSpPr>
+            <a:spLocks noGrp="1"/>
+          </p:cNvSpPr>
+          <p:nvPr>
+            <p:ph type="sldNum" sz="quarter" idx="10"/>
+          </p:nvPr>
+        </p:nvSpPr>
+        <p:spPr/>
+        <p:txBody>
+          <a:bodyPr/>
+          <a:lstStyle/>
+          <a:p>
+            <a:fld id="{165BAAFA-8569-4F3A-B5A8-377F352D7750}" type="slidenum">
+              <a:rPr lang="en-US" smtClean="0"/>
+              <a:pPr/>
+              <a:t>8</a:t>
+            </a:fld>
+            <a:endParaRPr lang="en-US"/>
+          </a:p>
+        </p:txBody>
+      </p:sp>
+    </p:spTree>
+    <p:extLst>
+      <p:ext uri="{BB962C8B-B14F-4D97-AF65-F5344CB8AC3E}">
+        <p14:creationId xmlns:p14="http://schemas.microsoft.com/office/powerpoint/2010/main" val="1616767406"/>
+      </p:ext>
+    </p:extLst>
+  </p:cSld>
+  <p:clrMapOvr>
+    <a:masterClrMapping/>
+  </p:clrMapOvr>
+</p:notes>
+</file>
+
+<file path=ppt/notesSlides/notesSlide9.xml><?xml version="1.0" encoding="utf-8"?>
+<p:notes xmlns:a="http://schemas.openxmlformats.org/drawingml/2006/main" xmlns:r="http://schemas.openxmlformats.org/officeDocument/2006/relationships" xmlns:p="http://schemas.openxmlformats.org/presentationml/2006/main">
+  <p:cSld>
+    <p:spTree>
+      <p:nvGrpSpPr>
+        <p:cNvPr id="1" name=""/>
+        <p:cNvGrpSpPr/>
+        <p:nvPr/>
+      </p:nvGrpSpPr>
+      <p:grpSpPr>
+        <a:xfrm>
+          <a:off x="0" y="0"/>
+          <a:ext cx="0" cy="0"/>
+          <a:chOff x="0" y="0"/>
+          <a:chExt cx="0" cy="0"/>
+        </a:xfrm>
+      </p:grpSpPr>
+      <p:sp>
+        <p:nvSpPr>
+          <p:cNvPr id="2" name="Slide Image Placeholder 1"/>
+          <p:cNvSpPr>
+            <a:spLocks noGrp="1" noRot="1" noChangeAspect="1"/>
+          </p:cNvSpPr>
+          <p:nvPr>
+            <p:ph type="sldImg"/>
+          </p:nvPr>
+        </p:nvSpPr>
+        <p:spPr/>
+      </p:sp>
+      <p:sp>
+        <p:nvSpPr>
+          <p:cNvPr id="3" name="Notes Placeholder 2"/>
+          <p:cNvSpPr>
+            <a:spLocks noGrp="1"/>
+          </p:cNvSpPr>
+          <p:nvPr>
+            <p:ph type="body" idx="1"/>
+          </p:nvPr>
+        </p:nvSpPr>
+        <p:spPr/>
+        <p:txBody>
+          <a:bodyPr/>
+          <a:lstStyle/>
+          <a:p>
+            <a:r>
+              <a:rPr lang="en-US" dirty="0" smtClean="0"/>
+              <a:t>Penny</a:t>
+            </a:r>
+            <a:endParaRPr lang="en-US" dirty="0"/>
+          </a:p>
+        </p:txBody>
+      </p:sp>
+      <p:sp>
+        <p:nvSpPr>
+          <p:cNvPr id="4" name="Slide Number Placeholder 3"/>
+          <p:cNvSpPr>
+            <a:spLocks noGrp="1"/>
+          </p:cNvSpPr>
+          <p:nvPr>
+            <p:ph type="sldNum" sz="quarter" idx="10"/>
+          </p:nvPr>
+        </p:nvSpPr>
+        <p:spPr/>
+        <p:txBody>
+          <a:bodyPr/>
+          <a:lstStyle/>
+          <a:p>
+            <a:fld id="{165BAAFA-8569-4F3A-B5A8-377F352D7750}" type="slidenum">
+              <a:rPr lang="en-US" smtClean="0"/>
+              <a:pPr/>
+              <a:t>9</a:t>
+            </a:fld>
+            <a:endParaRPr lang="en-US"/>
+          </a:p>
+        </p:txBody>
+      </p:sp>
+    </p:spTree>
+    <p:extLst>
+      <p:ext uri="{BB962C8B-B14F-4D97-AF65-F5344CB8AC3E}">
+        <p14:creationId xmlns:p14="http://schemas.microsoft.com/office/powerpoint/2010/main" val="2690894410"/>
       </p:ext>
     </p:extLst>
   </p:cSld>
@@ -4207,7 +5282,7 @@
           <a:p>
             <a:r>
               <a:rPr lang="en-US" dirty="0" smtClean="0"/>
-              <a:t>Work Outlook</a:t>
+              <a:t>ADS Subsystems</a:t>
             </a:r>
             <a:endParaRPr lang="en-US" dirty="0"/>
           </a:p>
@@ -4228,821 +5303,13 @@
           <a:bodyPr/>
           <a:lstStyle/>
           <a:p>
-            <a:r>
-              <a:rPr lang="en-US" dirty="0" smtClean="0"/>
-              <a:t>ADS Document – Sept. 12</a:t>
-            </a:r>
-          </a:p>
-          <a:p>
-            <a:r>
-              <a:rPr lang="en-US" dirty="0" smtClean="0"/>
-              <a:t>ADS Gate Review – Sept. 13</a:t>
-            </a:r>
-          </a:p>
-          <a:p>
-            <a:r>
-              <a:rPr lang="en-US" dirty="0" smtClean="0"/>
-              <a:t>Team ITUS peer review – before Sept.14</a:t>
-            </a:r>
-          </a:p>
-          <a:p>
-            <a:r>
-              <a:rPr lang="en-US" dirty="0" smtClean="0"/>
-              <a:t>Team Meetings</a:t>
-            </a:r>
-          </a:p>
-          <a:p>
-            <a:r>
-              <a:rPr lang="en-US" dirty="0" smtClean="0"/>
-              <a:t>Meetings w/ Sponsor</a:t>
-            </a:r>
-          </a:p>
-          <a:p>
-            <a:endParaRPr lang="en-US" dirty="0"/>
-          </a:p>
-        </p:txBody>
-      </p:sp>
-    </p:spTree>
-    <p:extLst>
-      <p:ext uri="{BB962C8B-B14F-4D97-AF65-F5344CB8AC3E}">
-        <p14:creationId xmlns:p14="http://schemas.microsoft.com/office/powerpoint/2010/main" val="373447769"/>
-      </p:ext>
-    </p:extLst>
-  </p:cSld>
-  <p:clrMapOvr>
-    <a:masterClrMapping/>
-  </p:clrMapOvr>
-  <p:timing>
-    <p:tnLst>
-      <p:par>
-        <p:cTn id="1" dur="indefinite" restart="never" nodeType="tmRoot"/>
-      </p:par>
-    </p:tnLst>
-  </p:timing>
-</p:sld>
-</file>
-
-<file path=ppt/slides/slide2.xml><?xml version="1.0" encoding="utf-8"?>
-<p:sld xmlns:a="http://schemas.openxmlformats.org/drawingml/2006/main" xmlns:r="http://schemas.openxmlformats.org/officeDocument/2006/relationships" xmlns:p="http://schemas.openxmlformats.org/presentationml/2006/main">
-  <p:cSld>
-    <p:spTree>
-      <p:nvGrpSpPr>
-        <p:cNvPr id="1" name=""/>
-        <p:cNvGrpSpPr/>
-        <p:nvPr/>
-      </p:nvGrpSpPr>
-      <p:grpSpPr>
-        <a:xfrm>
-          <a:off x="0" y="0"/>
-          <a:ext cx="0" cy="0"/>
-          <a:chOff x="0" y="0"/>
-          <a:chExt cx="0" cy="0"/>
-        </a:xfrm>
-      </p:grpSpPr>
-      <p:sp>
-        <p:nvSpPr>
-          <p:cNvPr id="2" name="Title 1"/>
-          <p:cNvSpPr>
-            <a:spLocks noGrp="1"/>
-          </p:cNvSpPr>
-          <p:nvPr>
-            <p:ph type="title"/>
-          </p:nvPr>
-        </p:nvSpPr>
-        <p:spPr/>
-        <p:txBody>
-          <a:bodyPr/>
-          <a:lstStyle/>
-          <a:p>
-            <a:r>
-              <a:rPr lang="en-US" dirty="0" smtClean="0"/>
-              <a:t>Staged </a:t>
-            </a:r>
-            <a:r>
-              <a:rPr lang="en-US" dirty="0" smtClean="0"/>
-              <a:t>Delivery</a:t>
-            </a:r>
-            <a:endParaRPr lang="en-US" dirty="0"/>
-          </a:p>
-        </p:txBody>
-      </p:sp>
-      <p:sp>
-        <p:nvSpPr>
-          <p:cNvPr id="3" name="Content Placeholder 2"/>
-          <p:cNvSpPr>
-            <a:spLocks noGrp="1"/>
-          </p:cNvSpPr>
-          <p:nvPr>
-            <p:ph idx="1"/>
-          </p:nvPr>
-        </p:nvSpPr>
-        <p:spPr/>
-        <p:txBody>
-          <a:bodyPr numCol="1">
-            <a:normAutofit/>
-          </a:bodyPr>
-          <a:lstStyle/>
-          <a:p>
-            <a:pPr fontAlgn="base"/>
-            <a:r>
-              <a:rPr lang="en-US" dirty="0"/>
-              <a:t>Stage 0 </a:t>
-            </a:r>
-          </a:p>
-          <a:p>
-            <a:pPr lvl="1" fontAlgn="base"/>
-            <a:r>
-              <a:rPr lang="en-US" dirty="0"/>
-              <a:t>Framework </a:t>
-            </a:r>
-            <a:endParaRPr lang="en-US" dirty="0" smtClean="0"/>
-          </a:p>
-          <a:p>
-            <a:pPr fontAlgn="base"/>
-            <a:r>
-              <a:rPr lang="en-US" dirty="0"/>
-              <a:t>Stage 1 </a:t>
-            </a:r>
-          </a:p>
-          <a:p>
-            <a:pPr lvl="1" fontAlgn="base"/>
-            <a:r>
-              <a:rPr lang="en-US" sz="2400" dirty="0"/>
-              <a:t>Unit </a:t>
-            </a:r>
-          </a:p>
-          <a:p>
-            <a:pPr fontAlgn="base"/>
-            <a:r>
-              <a:rPr lang="en-US" dirty="0" smtClean="0"/>
-              <a:t>Stage </a:t>
-            </a:r>
-            <a:r>
-              <a:rPr lang="en-US" dirty="0"/>
-              <a:t>2 </a:t>
-            </a:r>
-          </a:p>
-          <a:p>
-            <a:pPr lvl="1" fontAlgn="base"/>
-            <a:r>
-              <a:rPr lang="en-US" sz="2400" dirty="0"/>
-              <a:t>Sensors </a:t>
-            </a:r>
-          </a:p>
-          <a:p>
-            <a:pPr lvl="1" fontAlgn="base"/>
-            <a:r>
-              <a:rPr lang="en-US" sz="2400" dirty="0" smtClean="0"/>
-              <a:t>Power </a:t>
-            </a:r>
-            <a:r>
-              <a:rPr lang="en-US" sz="2400" dirty="0"/>
-              <a:t>Source </a:t>
-            </a:r>
-          </a:p>
-          <a:p>
-            <a:pPr lvl="1" fontAlgn="base"/>
-            <a:r>
-              <a:rPr lang="en-US" sz="2400" dirty="0" err="1"/>
-              <a:t>DataHandler</a:t>
-            </a:r>
-            <a:r>
-              <a:rPr lang="en-US" sz="2400" dirty="0"/>
-              <a:t> </a:t>
-            </a:r>
-            <a:r>
-              <a:rPr lang="en-US" sz="2400" dirty="0" smtClean="0"/>
-              <a:t>Subsystem </a:t>
-            </a:r>
-            <a:r>
-              <a:rPr lang="en-US" dirty="0" smtClean="0"/>
-              <a:t> </a:t>
-            </a:r>
-            <a:r>
-              <a:rPr lang="en-US" dirty="0"/>
-              <a:t> </a:t>
-            </a:r>
-          </a:p>
-        </p:txBody>
-      </p:sp>
-    </p:spTree>
-    <p:extLst>
-      <p:ext uri="{BB962C8B-B14F-4D97-AF65-F5344CB8AC3E}">
-        <p14:creationId xmlns:p14="http://schemas.microsoft.com/office/powerpoint/2010/main" val="3242721611"/>
-      </p:ext>
-    </p:extLst>
-  </p:cSld>
-  <p:clrMapOvr>
-    <a:masterClrMapping/>
-  </p:clrMapOvr>
-  <p:timing>
-    <p:tnLst>
-      <p:par>
-        <p:cTn id="1" dur="indefinite" restart="never" nodeType="tmRoot"/>
-      </p:par>
-    </p:tnLst>
-  </p:timing>
-</p:sld>
-</file>
-
-<file path=ppt/slides/slide3.xml><?xml version="1.0" encoding="utf-8"?>
-<p:sld xmlns:a="http://schemas.openxmlformats.org/drawingml/2006/main" xmlns:r="http://schemas.openxmlformats.org/officeDocument/2006/relationships" xmlns:p="http://schemas.openxmlformats.org/presentationml/2006/main">
-  <p:cSld>
-    <p:spTree>
-      <p:nvGrpSpPr>
-        <p:cNvPr id="1" name=""/>
-        <p:cNvGrpSpPr/>
-        <p:nvPr/>
-      </p:nvGrpSpPr>
-      <p:grpSpPr>
-        <a:xfrm>
-          <a:off x="0" y="0"/>
-          <a:ext cx="0" cy="0"/>
-          <a:chOff x="0" y="0"/>
-          <a:chExt cx="0" cy="0"/>
-        </a:xfrm>
-      </p:grpSpPr>
-      <p:sp>
-        <p:nvSpPr>
-          <p:cNvPr id="2" name="Title 1"/>
-          <p:cNvSpPr>
-            <a:spLocks noGrp="1"/>
-          </p:cNvSpPr>
-          <p:nvPr>
-            <p:ph type="title"/>
-          </p:nvPr>
-        </p:nvSpPr>
-        <p:spPr/>
-        <p:txBody>
-          <a:bodyPr/>
-          <a:lstStyle/>
-          <a:p>
-            <a:r>
-              <a:rPr lang="en-US" dirty="0"/>
-              <a:t>Staged Delivery</a:t>
-            </a:r>
-          </a:p>
-        </p:txBody>
-      </p:sp>
-      <p:sp>
-        <p:nvSpPr>
-          <p:cNvPr id="3" name="Content Placeholder 2"/>
-          <p:cNvSpPr>
-            <a:spLocks noGrp="1"/>
-          </p:cNvSpPr>
-          <p:nvPr>
-            <p:ph idx="1"/>
-          </p:nvPr>
-        </p:nvSpPr>
-        <p:spPr/>
-        <p:txBody>
-          <a:bodyPr/>
-          <a:lstStyle/>
-          <a:p>
-            <a:pPr fontAlgn="base"/>
-            <a:r>
-              <a:rPr lang="en-US" dirty="0"/>
-              <a:t>Stage 3 </a:t>
-            </a:r>
-          </a:p>
-          <a:p>
-            <a:pPr lvl="1" fontAlgn="base"/>
-            <a:r>
-              <a:rPr lang="en-US" sz="2400" dirty="0"/>
-              <a:t>Storage Manager </a:t>
-            </a:r>
-            <a:r>
-              <a:rPr lang="en-US" dirty="0"/>
-              <a:t> </a:t>
-            </a:r>
-          </a:p>
-          <a:p>
-            <a:pPr lvl="1" fontAlgn="base"/>
-            <a:r>
-              <a:rPr lang="en-US" sz="2400" dirty="0" err="1"/>
-              <a:t>DataHandler</a:t>
-            </a:r>
-            <a:r>
-              <a:rPr lang="en-US" sz="2400" dirty="0"/>
-              <a:t>  Subsystem </a:t>
-            </a:r>
-            <a:endParaRPr lang="en-US" dirty="0"/>
-          </a:p>
-          <a:p>
-            <a:pPr fontAlgn="base"/>
-            <a:r>
-              <a:rPr lang="en-US" dirty="0"/>
-              <a:t>Stage 4 </a:t>
-            </a:r>
-          </a:p>
-          <a:p>
-            <a:pPr lvl="1" fontAlgn="base"/>
-            <a:r>
-              <a:rPr lang="en-US" sz="2400" dirty="0"/>
-              <a:t>Calibration </a:t>
-            </a:r>
-          </a:p>
-          <a:p>
-            <a:pPr lvl="1" fontAlgn="base"/>
-            <a:r>
-              <a:rPr lang="en-US" sz="2400" dirty="0"/>
-              <a:t>Processing of Data </a:t>
-            </a:r>
-          </a:p>
-          <a:p>
-            <a:pPr lvl="2" fontAlgn="base"/>
-            <a:r>
-              <a:rPr lang="en-US" dirty="0"/>
-              <a:t>Algorithm </a:t>
-            </a:r>
-          </a:p>
-          <a:p>
-            <a:pPr lvl="2" fontAlgn="base"/>
-            <a:r>
-              <a:rPr lang="en-US" dirty="0"/>
-              <a:t>Storing Processed Data </a:t>
-            </a:r>
-          </a:p>
-          <a:p>
-            <a:endParaRPr lang="en-US" dirty="0"/>
-          </a:p>
-        </p:txBody>
-      </p:sp>
-    </p:spTree>
-    <p:extLst>
-      <p:ext uri="{BB962C8B-B14F-4D97-AF65-F5344CB8AC3E}">
-        <p14:creationId xmlns:p14="http://schemas.microsoft.com/office/powerpoint/2010/main" val="769495751"/>
-      </p:ext>
-    </p:extLst>
-  </p:cSld>
-  <p:clrMapOvr>
-    <a:masterClrMapping/>
-  </p:clrMapOvr>
-  <p:timing>
-    <p:tnLst>
-      <p:par>
-        <p:cTn id="1" dur="indefinite" restart="never" nodeType="tmRoot"/>
-      </p:par>
-    </p:tnLst>
-  </p:timing>
-</p:sld>
-</file>
-
-<file path=ppt/slides/slide4.xml><?xml version="1.0" encoding="utf-8"?>
-<p:sld xmlns:a="http://schemas.openxmlformats.org/drawingml/2006/main" xmlns:r="http://schemas.openxmlformats.org/officeDocument/2006/relationships" xmlns:p="http://schemas.openxmlformats.org/presentationml/2006/main">
-  <p:cSld>
-    <p:spTree>
-      <p:nvGrpSpPr>
-        <p:cNvPr id="1" name=""/>
-        <p:cNvGrpSpPr/>
-        <p:nvPr/>
-      </p:nvGrpSpPr>
-      <p:grpSpPr>
-        <a:xfrm>
-          <a:off x="0" y="0"/>
-          <a:ext cx="0" cy="0"/>
-          <a:chOff x="0" y="0"/>
-          <a:chExt cx="0" cy="0"/>
-        </a:xfrm>
-      </p:grpSpPr>
-      <p:sp>
-        <p:nvSpPr>
-          <p:cNvPr id="2" name="Title 1"/>
-          <p:cNvSpPr>
-            <a:spLocks noGrp="1"/>
-          </p:cNvSpPr>
-          <p:nvPr>
-            <p:ph type="title"/>
-          </p:nvPr>
-        </p:nvSpPr>
-        <p:spPr/>
-        <p:txBody>
-          <a:bodyPr/>
-          <a:lstStyle/>
-          <a:p>
-            <a:r>
-              <a:rPr lang="en-US" dirty="0" smtClean="0"/>
-              <a:t>Staged </a:t>
-            </a:r>
-            <a:r>
-              <a:rPr lang="en-US" dirty="0"/>
-              <a:t>Delivery</a:t>
-            </a:r>
-          </a:p>
-        </p:txBody>
-      </p:sp>
-      <p:sp>
-        <p:nvSpPr>
-          <p:cNvPr id="3" name="Content Placeholder 2"/>
-          <p:cNvSpPr>
-            <a:spLocks noGrp="1"/>
-          </p:cNvSpPr>
-          <p:nvPr>
-            <p:ph idx="1"/>
-          </p:nvPr>
-        </p:nvSpPr>
-        <p:spPr/>
-        <p:txBody>
-          <a:bodyPr numCol="1">
-            <a:normAutofit/>
-          </a:bodyPr>
-          <a:lstStyle/>
-          <a:p>
-            <a:pPr fontAlgn="base"/>
-            <a:r>
-              <a:rPr lang="en-US" dirty="0"/>
-              <a:t>Stage 5 </a:t>
-            </a:r>
-          </a:p>
-          <a:p>
-            <a:pPr lvl="1" fontAlgn="base"/>
-            <a:r>
-              <a:rPr lang="en-US" sz="2400" dirty="0"/>
-              <a:t>Lights</a:t>
-            </a:r>
-            <a:r>
-              <a:rPr lang="en-US" dirty="0"/>
-              <a:t> </a:t>
-            </a:r>
-          </a:p>
-          <a:p>
-            <a:pPr lvl="1" fontAlgn="base"/>
-            <a:r>
-              <a:rPr lang="en-US" sz="2400" dirty="0" err="1"/>
-              <a:t>DataHandler</a:t>
-            </a:r>
-            <a:r>
-              <a:rPr lang="en-US" sz="2400" dirty="0"/>
-              <a:t> subsystem </a:t>
-            </a:r>
-          </a:p>
-          <a:p>
-            <a:pPr fontAlgn="base"/>
-            <a:r>
-              <a:rPr lang="en-US" dirty="0" smtClean="0"/>
-              <a:t>Stage </a:t>
-            </a:r>
-            <a:r>
-              <a:rPr lang="en-US" dirty="0"/>
-              <a:t>6 </a:t>
-            </a:r>
-          </a:p>
-          <a:p>
-            <a:pPr lvl="1" fontAlgn="base"/>
-            <a:r>
-              <a:rPr lang="en-US" sz="2400" dirty="0" err="1"/>
-              <a:t>Gui</a:t>
-            </a:r>
-            <a:r>
-              <a:rPr lang="en-US" sz="2400" dirty="0"/>
-              <a:t> </a:t>
-            </a:r>
-          </a:p>
-          <a:p>
-            <a:pPr lvl="2" fontAlgn="base"/>
-            <a:r>
-              <a:rPr lang="en-US" dirty="0"/>
-              <a:t>Display Raw Data </a:t>
-            </a:r>
-          </a:p>
-          <a:p>
-            <a:pPr fontAlgn="base"/>
-            <a:r>
-              <a:rPr lang="en-US" dirty="0" smtClean="0"/>
-              <a:t>Stage </a:t>
-            </a:r>
-            <a:r>
-              <a:rPr lang="en-US" dirty="0"/>
-              <a:t>7 </a:t>
-            </a:r>
-          </a:p>
-          <a:p>
-            <a:pPr lvl="1" fontAlgn="base"/>
-            <a:r>
-              <a:rPr lang="en-US" sz="2400" dirty="0"/>
-              <a:t>Networking </a:t>
-            </a:r>
-          </a:p>
-        </p:txBody>
-      </p:sp>
-    </p:spTree>
-    <p:extLst>
-      <p:ext uri="{BB962C8B-B14F-4D97-AF65-F5344CB8AC3E}">
-        <p14:creationId xmlns:p14="http://schemas.microsoft.com/office/powerpoint/2010/main" val="1701365845"/>
-      </p:ext>
-    </p:extLst>
-  </p:cSld>
-  <p:clrMapOvr>
-    <a:masterClrMapping/>
-  </p:clrMapOvr>
-  <p:timing>
-    <p:tnLst>
-      <p:par>
-        <p:cTn id="1" dur="indefinite" restart="never" nodeType="tmRoot"/>
-      </p:par>
-    </p:tnLst>
-  </p:timing>
-</p:sld>
-</file>
-
-<file path=ppt/slides/slide5.xml><?xml version="1.0" encoding="utf-8"?>
-<p:sld xmlns:a="http://schemas.openxmlformats.org/drawingml/2006/main" xmlns:r="http://schemas.openxmlformats.org/officeDocument/2006/relationships" xmlns:p="http://schemas.openxmlformats.org/presentationml/2006/main">
-  <p:cSld>
-    <p:spTree>
-      <p:nvGrpSpPr>
-        <p:cNvPr id="1" name=""/>
-        <p:cNvGrpSpPr/>
-        <p:nvPr/>
-      </p:nvGrpSpPr>
-      <p:grpSpPr>
-        <a:xfrm>
-          <a:off x="0" y="0"/>
-          <a:ext cx="0" cy="0"/>
-          <a:chOff x="0" y="0"/>
-          <a:chExt cx="0" cy="0"/>
-        </a:xfrm>
-      </p:grpSpPr>
-      <p:sp>
-        <p:nvSpPr>
-          <p:cNvPr id="2" name="Title 1"/>
-          <p:cNvSpPr>
-            <a:spLocks noGrp="1"/>
-          </p:cNvSpPr>
-          <p:nvPr>
-            <p:ph type="title"/>
-          </p:nvPr>
-        </p:nvSpPr>
-        <p:spPr/>
-        <p:txBody>
-          <a:bodyPr/>
-          <a:lstStyle/>
-          <a:p>
-            <a:r>
-              <a:rPr lang="en-US" dirty="0"/>
-              <a:t>Staged Delivery</a:t>
-            </a:r>
-          </a:p>
-        </p:txBody>
-      </p:sp>
-      <p:sp>
-        <p:nvSpPr>
-          <p:cNvPr id="3" name="Content Placeholder 2"/>
-          <p:cNvSpPr>
-            <a:spLocks noGrp="1"/>
-          </p:cNvSpPr>
-          <p:nvPr>
-            <p:ph idx="1"/>
-          </p:nvPr>
-        </p:nvSpPr>
-        <p:spPr/>
-        <p:txBody>
-          <a:bodyPr>
-            <a:normAutofit fontScale="92500" lnSpcReduction="20000"/>
-          </a:bodyPr>
-          <a:lstStyle/>
-          <a:p>
-            <a:pPr fontAlgn="base"/>
-            <a:r>
-              <a:rPr lang="en-US" dirty="0"/>
-              <a:t>Stage 8 </a:t>
-            </a:r>
-          </a:p>
-          <a:p>
-            <a:pPr lvl="1" fontAlgn="base"/>
-            <a:r>
-              <a:rPr lang="en-US" sz="2400" dirty="0"/>
-              <a:t>GUI </a:t>
-            </a:r>
-          </a:p>
-          <a:p>
-            <a:pPr lvl="2" fontAlgn="base"/>
-            <a:r>
-              <a:rPr lang="en-US" dirty="0"/>
-              <a:t>Shows Raw Data </a:t>
-            </a:r>
-          </a:p>
-          <a:p>
-            <a:pPr lvl="2" fontAlgn="base"/>
-            <a:r>
-              <a:rPr lang="en-US" dirty="0"/>
-              <a:t>Shows Processed Data  </a:t>
-            </a:r>
-          </a:p>
-          <a:p>
-            <a:pPr lvl="2" fontAlgn="base"/>
-            <a:r>
-              <a:rPr lang="en-US" dirty="0"/>
-              <a:t>Changes UIC </a:t>
-            </a:r>
-          </a:p>
-          <a:p>
-            <a:pPr lvl="2" fontAlgn="base"/>
-            <a:r>
-              <a:rPr lang="en-US" dirty="0"/>
-              <a:t>Calibrate option </a:t>
-            </a:r>
-          </a:p>
-          <a:p>
-            <a:pPr lvl="2" fontAlgn="base"/>
-            <a:r>
-              <a:rPr lang="en-US" dirty="0"/>
-              <a:t>Requests Stored Data </a:t>
-            </a:r>
-          </a:p>
-          <a:p>
-            <a:pPr fontAlgn="base"/>
-            <a:r>
-              <a:rPr lang="en-US" dirty="0"/>
-              <a:t>Stage 9 </a:t>
-            </a:r>
-          </a:p>
-          <a:p>
-            <a:pPr lvl="1" fontAlgn="base"/>
-            <a:r>
-              <a:rPr lang="en-US" sz="2400" dirty="0" err="1"/>
-              <a:t>Gui</a:t>
-            </a:r>
-            <a:r>
-              <a:rPr lang="en-US" sz="2400" dirty="0"/>
-              <a:t> Graph Data </a:t>
-            </a:r>
-          </a:p>
-          <a:p>
-            <a:pPr lvl="1" fontAlgn="base"/>
-            <a:r>
-              <a:rPr lang="en-US" sz="2400" dirty="0"/>
-              <a:t>GPS data </a:t>
-            </a:r>
-          </a:p>
-          <a:p>
-            <a:pPr lvl="1" fontAlgn="base"/>
-            <a:r>
-              <a:rPr lang="en-US" sz="2400" dirty="0" err="1"/>
-              <a:t>Gui</a:t>
-            </a:r>
-            <a:r>
-              <a:rPr lang="en-US" sz="2400" dirty="0"/>
-              <a:t> GPS </a:t>
-            </a:r>
-          </a:p>
-          <a:p>
-            <a:pPr lvl="1" fontAlgn="base"/>
-            <a:r>
-              <a:rPr lang="en-US" sz="2400" dirty="0"/>
-              <a:t>Removable Storage </a:t>
-            </a:r>
-          </a:p>
-          <a:p>
-            <a:endParaRPr lang="en-US" dirty="0"/>
-          </a:p>
-        </p:txBody>
-      </p:sp>
-    </p:spTree>
-    <p:extLst>
-      <p:ext uri="{BB962C8B-B14F-4D97-AF65-F5344CB8AC3E}">
-        <p14:creationId xmlns:p14="http://schemas.microsoft.com/office/powerpoint/2010/main" val="1094963687"/>
-      </p:ext>
-    </p:extLst>
-  </p:cSld>
-  <p:clrMapOvr>
-    <a:masterClrMapping/>
-  </p:clrMapOvr>
-  <p:timing>
-    <p:tnLst>
-      <p:par>
-        <p:cTn id="1" dur="indefinite" restart="never" nodeType="tmRoot"/>
-      </p:par>
-    </p:tnLst>
-  </p:timing>
-</p:sld>
-</file>
-
-<file path=ppt/slides/slide6.xml><?xml version="1.0" encoding="utf-8"?>
-<p:sld xmlns:a="http://schemas.openxmlformats.org/drawingml/2006/main" xmlns:r="http://schemas.openxmlformats.org/officeDocument/2006/relationships" xmlns:p="http://schemas.openxmlformats.org/presentationml/2006/main" show="0">
-  <p:cSld>
-    <p:spTree>
-      <p:nvGrpSpPr>
-        <p:cNvPr id="1" name=""/>
-        <p:cNvGrpSpPr/>
-        <p:nvPr/>
-      </p:nvGrpSpPr>
-      <p:grpSpPr>
-        <a:xfrm>
-          <a:off x="0" y="0"/>
-          <a:ext cx="0" cy="0"/>
-          <a:chOff x="0" y="0"/>
-          <a:chExt cx="0" cy="0"/>
-        </a:xfrm>
-      </p:grpSpPr>
-      <p:sp>
-        <p:nvSpPr>
-          <p:cNvPr id="2" name="Title 1"/>
-          <p:cNvSpPr>
-            <a:spLocks noGrp="1"/>
-          </p:cNvSpPr>
-          <p:nvPr>
-            <p:ph type="title"/>
-          </p:nvPr>
-        </p:nvSpPr>
-        <p:spPr/>
-        <p:txBody>
-          <a:bodyPr/>
-          <a:lstStyle/>
-          <a:p>
-            <a:r>
-              <a:rPr lang="en-US" dirty="0" smtClean="0"/>
-              <a:t>ADS Diagram</a:t>
-            </a:r>
-            <a:endParaRPr lang="en-US" dirty="0"/>
-          </a:p>
-        </p:txBody>
-      </p:sp>
-      <p:sp>
-        <p:nvSpPr>
-          <p:cNvPr id="3" name="Content Placeholder 2"/>
-          <p:cNvSpPr>
-            <a:spLocks noGrp="1"/>
-          </p:cNvSpPr>
-          <p:nvPr>
-            <p:ph idx="1"/>
-          </p:nvPr>
-        </p:nvSpPr>
-        <p:spPr/>
-        <p:txBody>
-          <a:bodyPr/>
-          <a:lstStyle/>
-          <a:p>
-            <a:endParaRPr lang="en-US" dirty="0"/>
+            <a:endParaRPr lang="en-US"/>
           </a:p>
         </p:txBody>
       </p:sp>
       <p:pic>
         <p:nvPicPr>
-          <p:cNvPr id="1027" name="Picture 3"/>
-          <p:cNvPicPr>
-            <a:picLocks noChangeAspect="1" noChangeArrowheads="1"/>
-          </p:cNvPicPr>
-          <p:nvPr/>
-        </p:nvPicPr>
-        <p:blipFill>
-          <a:blip r:embed="rId2">
-            <a:extLst>
-              <a:ext uri="{28A0092B-C50C-407E-A947-70E740481C1C}">
-                <a14:useLocalDpi xmlns:a14="http://schemas.microsoft.com/office/drawing/2010/main" val="0"/>
-              </a:ext>
-            </a:extLst>
-          </a:blip>
-          <a:srcRect/>
-          <a:stretch>
-            <a:fillRect/>
-          </a:stretch>
-        </p:blipFill>
-        <p:spPr bwMode="auto">
-          <a:xfrm>
-            <a:off x="228600" y="733424"/>
-            <a:ext cx="4910360" cy="2314575"/>
-          </a:xfrm>
-          <a:prstGeom prst="rect">
-            <a:avLst/>
-          </a:prstGeom>
-          <a:noFill/>
-          <a:ln>
-            <a:noFill/>
-          </a:ln>
-          <a:effectLst/>
-          <a:extLst>
-            <a:ext uri="{909E8E84-426E-40DD-AFC4-6F175D3DCCD1}">
-              <a14:hiddenFill xmlns:a14="http://schemas.microsoft.com/office/drawing/2010/main">
-                <a:solidFill>
-                  <a:schemeClr val="accent1"/>
-                </a:solidFill>
-              </a14:hiddenFill>
-            </a:ext>
-            <a:ext uri="{91240B29-F687-4F45-9708-019B960494DF}">
-              <a14:hiddenLine xmlns:a14="http://schemas.microsoft.com/office/drawing/2010/main" w="9525">
-                <a:solidFill>
-                  <a:schemeClr val="tx1"/>
-                </a:solidFill>
-                <a:miter lim="800000"/>
-                <a:headEnd/>
-                <a:tailEnd/>
-              </a14:hiddenLine>
-            </a:ext>
-            <a:ext uri="{AF507438-7753-43E0-B8FC-AC1667EBCBE1}">
-              <a14:hiddenEffects xmlns:a14="http://schemas.microsoft.com/office/drawing/2010/main">
-                <a:effectLst>
-                  <a:outerShdw dist="35921" dir="2700000" algn="ctr" rotWithShape="0">
-                    <a:schemeClr val="bg2"/>
-                  </a:outerShdw>
-                </a:effectLst>
-              </a14:hiddenEffects>
-            </a:ext>
-          </a:extLst>
-        </p:spPr>
-      </p:pic>
-      <p:pic>
-        <p:nvPicPr>
-          <p:cNvPr id="1028" name="Picture 4"/>
+          <p:cNvPr id="2051" name="Picture 3"/>
           <p:cNvPicPr>
             <a:picLocks noChangeAspect="1" noChangeArrowheads="1"/>
           </p:cNvPicPr>
@@ -5063,72 +5330,8 @@
         </p:blipFill>
         <p:spPr bwMode="auto">
           <a:xfrm>
-            <a:off x="5333999" y="685800"/>
-            <a:ext cx="3701143" cy="2590800"/>
-          </a:xfrm>
-          <a:prstGeom prst="rect">
-            <a:avLst/>
-          </a:prstGeom>
-          <a:noFill/>
-          <a:ln>
-            <a:noFill/>
-          </a:ln>
-          <a:effectLst/>
-          <a:extLst>
-            <a:ext uri="{909E8E84-426E-40DD-AFC4-6F175D3DCCD1}">
-              <a14:hiddenFill xmlns:a14="http://schemas.microsoft.com/office/drawing/2010/main">
-                <a:solidFill>
-                  <a:schemeClr val="accent1"/>
-                </a:solidFill>
-              </a14:hiddenFill>
-            </a:ext>
-            <a:ext uri="{91240B29-F687-4F45-9708-019B960494DF}">
-              <a14:hiddenLine xmlns:a14="http://schemas.microsoft.com/office/drawing/2010/main" w="9525">
-                <a:solidFill>
-                  <a:schemeClr val="tx1"/>
-                </a:solidFill>
-                <a:miter lim="800000"/>
-                <a:headEnd/>
-                <a:tailEnd/>
-              </a14:hiddenLine>
-            </a:ext>
-            <a:ext uri="{AF507438-7753-43E0-B8FC-AC1667EBCBE1}">
-              <a14:hiddenEffects xmlns:a14="http://schemas.microsoft.com/office/drawing/2010/main">
-                <a:effectLst>
-                  <a:outerShdw dist="35921" dir="2700000" algn="ctr" rotWithShape="0">
-                    <a:schemeClr val="bg2"/>
-                  </a:outerShdw>
-                </a:effectLst>
-              </a14:hiddenEffects>
-            </a:ext>
-          </a:extLst>
-        </p:spPr>
-      </p:pic>
-      <p:pic>
-        <p:nvPicPr>
-          <p:cNvPr id="1029" name="Picture 5"/>
-          <p:cNvPicPr>
-            <a:picLocks noChangeAspect="1" noChangeArrowheads="1"/>
-          </p:cNvPicPr>
-          <p:nvPr/>
-        </p:nvPicPr>
-        <p:blipFill>
-          <a:blip r:embed="rId4">
-            <a:extLst>
-              <a:ext uri="{28A0092B-C50C-407E-A947-70E740481C1C}">
-                <a14:useLocalDpi xmlns:a14="http://schemas.microsoft.com/office/drawing/2010/main" val="0"/>
-              </a:ext>
-            </a:extLst>
-          </a:blip>
-          <a:srcRect/>
-          <a:stretch>
-            <a:fillRect/>
-          </a:stretch>
-        </p:blipFill>
-        <p:spPr bwMode="auto">
-          <a:xfrm>
-            <a:off x="1704643" y="3124200"/>
-            <a:ext cx="3505200" cy="2023222"/>
+            <a:off x="1447800" y="641498"/>
+            <a:ext cx="6157393" cy="4191000"/>
           </a:xfrm>
           <a:prstGeom prst="rect">
             <a:avLst/>
@@ -5171,21 +5374,13 @@
     </p:spTree>
     <p:extLst>
       <p:ext uri="{BB962C8B-B14F-4D97-AF65-F5344CB8AC3E}">
-        <p14:creationId xmlns:p14="http://schemas.microsoft.com/office/powerpoint/2010/main" val="3308080953"/>
+        <p14:creationId xmlns:p14="http://schemas.microsoft.com/office/powerpoint/2010/main" val="2104671418"/>
       </p:ext>
     </p:extLst>
   </p:cSld>
   <p:clrMapOvr>
     <a:masterClrMapping/>
   </p:clrMapOvr>
-  <mc:AlternateContent xmlns:mc="http://schemas.openxmlformats.org/markup-compatibility/2006">
-    <mc:Choice xmlns:p14="http://schemas.microsoft.com/office/powerpoint/2010/main" Requires="p14">
-      <p:transition spd="slow" p14:dur="2000"/>
-    </mc:Choice>
-    <mc:Fallback>
-      <p:transition spd="slow"/>
-    </mc:Fallback>
-  </mc:AlternateContent>
   <p:timing>
     <p:tnLst>
       <p:par>
@@ -5196,8 +5391,8 @@
 </p:sld>
 </file>
 
-<file path=ppt/slides/slide7.xml><?xml version="1.0" encoding="utf-8"?>
-<p:sld xmlns:a="http://schemas.openxmlformats.org/drawingml/2006/main" xmlns:r="http://schemas.openxmlformats.org/officeDocument/2006/relationships" xmlns:p="http://schemas.openxmlformats.org/presentationml/2006/main" show="0">
+<file path=ppt/slides/slide11.xml><?xml version="1.0" encoding="utf-8"?>
+<p:sld xmlns:a="http://schemas.openxmlformats.org/drawingml/2006/main" xmlns:r="http://schemas.openxmlformats.org/officeDocument/2006/relationships" xmlns:p="http://schemas.openxmlformats.org/presentationml/2006/main">
   <p:cSld>
     <p:spTree>
       <p:nvGrpSpPr>
@@ -5230,7 +5425,7 @@
           <a:p>
             <a:r>
               <a:rPr lang="en-US" dirty="0" smtClean="0"/>
-              <a:t>ADS Diagram</a:t>
+              <a:t>ADS Subsystems</a:t>
             </a:r>
             <a:endParaRPr lang="en-US" dirty="0"/>
           </a:p>
@@ -5257,71 +5452,7 @@
       </p:sp>
       <p:pic>
         <p:nvPicPr>
-          <p:cNvPr id="2050" name="Picture 2"/>
-          <p:cNvPicPr>
-            <a:picLocks noChangeAspect="1" noChangeArrowheads="1"/>
-          </p:cNvPicPr>
-          <p:nvPr/>
-        </p:nvPicPr>
-        <p:blipFill>
-          <a:blip r:embed="rId2">
-            <a:extLst>
-              <a:ext uri="{28A0092B-C50C-407E-A947-70E740481C1C}">
-                <a14:useLocalDpi xmlns:a14="http://schemas.microsoft.com/office/drawing/2010/main" val="0"/>
-              </a:ext>
-            </a:extLst>
-          </a:blip>
-          <a:srcRect/>
-          <a:stretch>
-            <a:fillRect/>
-          </a:stretch>
-        </p:blipFill>
-        <p:spPr bwMode="auto">
-          <a:xfrm>
-            <a:off x="304800" y="533400"/>
-            <a:ext cx="3677265" cy="2514600"/>
-          </a:xfrm>
-          <a:prstGeom prst="rect">
-            <a:avLst/>
-          </a:prstGeom>
-          <a:noFill/>
-          <a:ln>
-            <a:noFill/>
-          </a:ln>
-          <a:effectLst/>
-          <a:extLst>
-            <a:ext uri="{909E8E84-426E-40DD-AFC4-6F175D3DCCD1}">
-              <a14:hiddenFill xmlns:a14="http://schemas.microsoft.com/office/drawing/2010/main">
-                <a:solidFill>
-                  <a:schemeClr val="accent1"/>
-                </a:solidFill>
-              </a14:hiddenFill>
-            </a:ext>
-            <a:ext uri="{91240B29-F687-4F45-9708-019B960494DF}">
-              <a14:hiddenLine xmlns:a14="http://schemas.microsoft.com/office/drawing/2010/main" w="9525">
-                <a:solidFill>
-                  <a:schemeClr val="tx1"/>
-                </a:solidFill>
-                <a:miter lim="800000"/>
-                <a:headEnd/>
-                <a:tailEnd/>
-              </a14:hiddenLine>
-            </a:ext>
-            <a:ext uri="{AF507438-7753-43E0-B8FC-AC1667EBCBE1}">
-              <a14:hiddenEffects xmlns:a14="http://schemas.microsoft.com/office/drawing/2010/main">
-                <a:effectLst>
-                  <a:outerShdw dist="35921" dir="2700000" algn="ctr" rotWithShape="0">
-                    <a:schemeClr val="bg2"/>
-                  </a:outerShdw>
-                </a:effectLst>
-              </a14:hiddenEffects>
-            </a:ext>
-          </a:extLst>
-        </p:spPr>
-      </p:pic>
-      <p:pic>
-        <p:nvPicPr>
-          <p:cNvPr id="2051" name="Picture 3"/>
+          <p:cNvPr id="2052" name="Picture 4"/>
           <p:cNvPicPr>
             <a:picLocks noChangeAspect="1" noChangeArrowheads="1"/>
           </p:cNvPicPr>
@@ -5342,8 +5473,8 @@
         </p:blipFill>
         <p:spPr bwMode="auto">
           <a:xfrm>
-            <a:off x="4696047" y="762000"/>
-            <a:ext cx="3505200" cy="3505200"/>
+            <a:off x="914400" y="1066800"/>
+            <a:ext cx="7331939" cy="3456024"/>
           </a:xfrm>
           <a:prstGeom prst="rect">
             <a:avLst/>
@@ -5386,21 +5517,13 @@
     </p:spTree>
     <p:extLst>
       <p:ext uri="{BB962C8B-B14F-4D97-AF65-F5344CB8AC3E}">
-        <p14:creationId xmlns:p14="http://schemas.microsoft.com/office/powerpoint/2010/main" val="6733679"/>
+        <p14:creationId xmlns:p14="http://schemas.microsoft.com/office/powerpoint/2010/main" val="2104671418"/>
       </p:ext>
     </p:extLst>
   </p:cSld>
   <p:clrMapOvr>
     <a:masterClrMapping/>
   </p:clrMapOvr>
-  <mc:AlternateContent xmlns:mc="http://schemas.openxmlformats.org/markup-compatibility/2006">
-    <mc:Choice xmlns:p14="http://schemas.microsoft.com/office/powerpoint/2010/main" Requires="p14">
-      <p:transition spd="slow" p14:dur="2000"/>
-    </mc:Choice>
-    <mc:Fallback>
-      <p:transition spd="slow"/>
-    </mc:Fallback>
-  </mc:AlternateContent>
   <p:timing>
     <p:tnLst>
       <p:par>
@@ -5411,7 +5534,7 @@
 </p:sld>
 </file>
 
-<file path=ppt/slides/slide8.xml><?xml version="1.0" encoding="utf-8"?>
+<file path=ppt/slides/slide12.xml><?xml version="1.0" encoding="utf-8"?>
 <p:sld xmlns:a="http://schemas.openxmlformats.org/drawingml/2006/main" xmlns:r="http://schemas.openxmlformats.org/officeDocument/2006/relationships" xmlns:p="http://schemas.openxmlformats.org/presentationml/2006/main">
   <p:cSld>
     <p:spTree>
@@ -5445,7 +5568,874 @@
           <a:p>
             <a:r>
               <a:rPr lang="en-US" dirty="0" smtClean="0"/>
-              <a:t>ADS Diagram</a:t>
+              <a:t>Work Progress</a:t>
+            </a:r>
+            <a:endParaRPr lang="en-US" dirty="0"/>
+          </a:p>
+        </p:txBody>
+      </p:sp>
+      <p:sp>
+        <p:nvSpPr>
+          <p:cNvPr id="3" name="Content Placeholder 2"/>
+          <p:cNvSpPr>
+            <a:spLocks noGrp="1"/>
+          </p:cNvSpPr>
+          <p:nvPr>
+            <p:ph idx="1"/>
+          </p:nvPr>
+        </p:nvSpPr>
+        <p:spPr/>
+        <p:txBody>
+          <a:bodyPr/>
+          <a:lstStyle/>
+          <a:p>
+            <a:pPr marL="0" indent="0">
+              <a:buNone/>
+            </a:pPr>
+            <a:endParaRPr lang="en-US" dirty="0"/>
+          </a:p>
+        </p:txBody>
+      </p:sp>
+      <p:pic>
+        <p:nvPicPr>
+          <p:cNvPr id="1026" name="Picture 2" descr="C:\Users\Jelly\Documents\GitHub\SlidingProfiler\Presentations\TBGL status  8-6-2012.png"/>
+          <p:cNvPicPr>
+            <a:picLocks noChangeAspect="1" noChangeArrowheads="1"/>
+          </p:cNvPicPr>
+          <p:nvPr/>
+        </p:nvPicPr>
+        <p:blipFill>
+          <a:blip r:embed="rId3">
+            <a:extLst>
+              <a:ext uri="{28A0092B-C50C-407E-A947-70E740481C1C}">
+                <a14:useLocalDpi xmlns:a14="http://schemas.microsoft.com/office/drawing/2010/main" val="0"/>
+              </a:ext>
+            </a:extLst>
+          </a:blip>
+          <a:srcRect/>
+          <a:stretch>
+            <a:fillRect/>
+          </a:stretch>
+        </p:blipFill>
+        <p:spPr bwMode="auto">
+          <a:xfrm>
+            <a:off x="914400" y="381000"/>
+            <a:ext cx="7072477" cy="4953000"/>
+          </a:xfrm>
+          <a:prstGeom prst="rect">
+            <a:avLst/>
+          </a:prstGeom>
+          <a:noFill/>
+          <a:extLst>
+            <a:ext uri="{909E8E84-426E-40DD-AFC4-6F175D3DCCD1}">
+              <a14:hiddenFill xmlns:a14="http://schemas.microsoft.com/office/drawing/2010/main">
+                <a:solidFill>
+                  <a:srgbClr val="FFFFFF"/>
+                </a:solidFill>
+              </a14:hiddenFill>
+            </a:ext>
+          </a:extLst>
+        </p:spPr>
+      </p:pic>
+    </p:spTree>
+    <p:extLst>
+      <p:ext uri="{BB962C8B-B14F-4D97-AF65-F5344CB8AC3E}">
+        <p14:creationId xmlns:p14="http://schemas.microsoft.com/office/powerpoint/2010/main" val="3532991015"/>
+      </p:ext>
+    </p:extLst>
+  </p:cSld>
+  <p:clrMapOvr>
+    <a:masterClrMapping/>
+  </p:clrMapOvr>
+  <p:timing>
+    <p:tnLst>
+      <p:par>
+        <p:cTn id="1" dur="indefinite" restart="never" nodeType="tmRoot"/>
+      </p:par>
+    </p:tnLst>
+  </p:timing>
+</p:sld>
+</file>
+
+<file path=ppt/slides/slide13.xml><?xml version="1.0" encoding="utf-8"?>
+<p:sld xmlns:a="http://schemas.openxmlformats.org/drawingml/2006/main" xmlns:r="http://schemas.openxmlformats.org/officeDocument/2006/relationships" xmlns:p="http://schemas.openxmlformats.org/presentationml/2006/main">
+  <p:cSld>
+    <p:spTree>
+      <p:nvGrpSpPr>
+        <p:cNvPr id="1" name=""/>
+        <p:cNvGrpSpPr/>
+        <p:nvPr/>
+      </p:nvGrpSpPr>
+      <p:grpSpPr>
+        <a:xfrm>
+          <a:off x="0" y="0"/>
+          <a:ext cx="0" cy="0"/>
+          <a:chOff x="0" y="0"/>
+          <a:chExt cx="0" cy="0"/>
+        </a:xfrm>
+      </p:grpSpPr>
+      <p:sp>
+        <p:nvSpPr>
+          <p:cNvPr id="2" name="Title 1"/>
+          <p:cNvSpPr>
+            <a:spLocks noGrp="1"/>
+          </p:cNvSpPr>
+          <p:nvPr>
+            <p:ph type="title"/>
+          </p:nvPr>
+        </p:nvSpPr>
+        <p:spPr/>
+        <p:txBody>
+          <a:bodyPr/>
+          <a:lstStyle/>
+          <a:p>
+            <a:r>
+              <a:rPr lang="en-US" dirty="0" smtClean="0"/>
+              <a:t>Work Outlook</a:t>
+            </a:r>
+            <a:endParaRPr lang="en-US" dirty="0"/>
+          </a:p>
+        </p:txBody>
+      </p:sp>
+      <p:sp>
+        <p:nvSpPr>
+          <p:cNvPr id="3" name="Content Placeholder 2"/>
+          <p:cNvSpPr>
+            <a:spLocks noGrp="1"/>
+          </p:cNvSpPr>
+          <p:nvPr>
+            <p:ph idx="1"/>
+          </p:nvPr>
+        </p:nvSpPr>
+        <p:spPr/>
+        <p:txBody>
+          <a:bodyPr/>
+          <a:lstStyle/>
+          <a:p>
+            <a:r>
+              <a:rPr lang="en-US" dirty="0" smtClean="0"/>
+              <a:t>ADS Document – Sept. 12</a:t>
+            </a:r>
+          </a:p>
+          <a:p>
+            <a:r>
+              <a:rPr lang="en-US" dirty="0" smtClean="0"/>
+              <a:t>ADS Gate Review – Sept. 13</a:t>
+            </a:r>
+          </a:p>
+          <a:p>
+            <a:r>
+              <a:rPr lang="en-US" dirty="0" smtClean="0"/>
+              <a:t>Team ITUS peer review – before Sept.14</a:t>
+            </a:r>
+          </a:p>
+          <a:p>
+            <a:r>
+              <a:rPr lang="en-US" dirty="0" smtClean="0"/>
+              <a:t>Team Meetings</a:t>
+            </a:r>
+          </a:p>
+          <a:p>
+            <a:r>
+              <a:rPr lang="en-US" dirty="0" smtClean="0"/>
+              <a:t>Meetings w/ Sponsor</a:t>
+            </a:r>
+          </a:p>
+          <a:p>
+            <a:endParaRPr lang="en-US" dirty="0"/>
+          </a:p>
+        </p:txBody>
+      </p:sp>
+    </p:spTree>
+    <p:extLst>
+      <p:ext uri="{BB962C8B-B14F-4D97-AF65-F5344CB8AC3E}">
+        <p14:creationId xmlns:p14="http://schemas.microsoft.com/office/powerpoint/2010/main" val="373447769"/>
+      </p:ext>
+    </p:extLst>
+  </p:cSld>
+  <p:clrMapOvr>
+    <a:masterClrMapping/>
+  </p:clrMapOvr>
+  <p:timing>
+    <p:tnLst>
+      <p:par>
+        <p:cTn id="1" dur="indefinite" restart="never" nodeType="tmRoot"/>
+      </p:par>
+    </p:tnLst>
+  </p:timing>
+</p:sld>
+</file>
+
+<file path=ppt/slides/slide2.xml><?xml version="1.0" encoding="utf-8"?>
+<p:sld xmlns:a="http://schemas.openxmlformats.org/drawingml/2006/main" xmlns:r="http://schemas.openxmlformats.org/officeDocument/2006/relationships" xmlns:p="http://schemas.openxmlformats.org/presentationml/2006/main">
+  <p:cSld>
+    <p:spTree>
+      <p:nvGrpSpPr>
+        <p:cNvPr id="1" name=""/>
+        <p:cNvGrpSpPr/>
+        <p:nvPr/>
+      </p:nvGrpSpPr>
+      <p:grpSpPr>
+        <a:xfrm>
+          <a:off x="0" y="0"/>
+          <a:ext cx="0" cy="0"/>
+          <a:chOff x="0" y="0"/>
+          <a:chExt cx="0" cy="0"/>
+        </a:xfrm>
+      </p:grpSpPr>
+      <p:sp>
+        <p:nvSpPr>
+          <p:cNvPr id="2" name="Title 1"/>
+          <p:cNvSpPr>
+            <a:spLocks noGrp="1"/>
+          </p:cNvSpPr>
+          <p:nvPr>
+            <p:ph type="title"/>
+          </p:nvPr>
+        </p:nvSpPr>
+        <p:spPr/>
+        <p:txBody>
+          <a:bodyPr/>
+          <a:lstStyle/>
+          <a:p>
+            <a:r>
+              <a:rPr lang="en-US" dirty="0" smtClean="0"/>
+              <a:t>Staged Delivery</a:t>
+            </a:r>
+            <a:endParaRPr lang="en-US" dirty="0"/>
+          </a:p>
+        </p:txBody>
+      </p:sp>
+      <p:sp>
+        <p:nvSpPr>
+          <p:cNvPr id="3" name="Content Placeholder 2"/>
+          <p:cNvSpPr>
+            <a:spLocks noGrp="1"/>
+          </p:cNvSpPr>
+          <p:nvPr>
+            <p:ph idx="1"/>
+          </p:nvPr>
+        </p:nvSpPr>
+        <p:spPr/>
+        <p:txBody>
+          <a:bodyPr numCol="1">
+            <a:normAutofit/>
+          </a:bodyPr>
+          <a:lstStyle/>
+          <a:p>
+            <a:pPr fontAlgn="base"/>
+            <a:r>
+              <a:rPr lang="en-US" dirty="0"/>
+              <a:t>Stage 0 </a:t>
+            </a:r>
+          </a:p>
+          <a:p>
+            <a:pPr lvl="1" fontAlgn="base"/>
+            <a:r>
+              <a:rPr lang="en-US" dirty="0"/>
+              <a:t>Framework </a:t>
+            </a:r>
+            <a:endParaRPr lang="en-US" dirty="0" smtClean="0"/>
+          </a:p>
+          <a:p>
+            <a:pPr fontAlgn="base"/>
+            <a:r>
+              <a:rPr lang="en-US" dirty="0"/>
+              <a:t>Stage 1 </a:t>
+            </a:r>
+          </a:p>
+          <a:p>
+            <a:pPr lvl="1" fontAlgn="base"/>
+            <a:r>
+              <a:rPr lang="en-US" sz="2400" dirty="0"/>
+              <a:t>Unit </a:t>
+            </a:r>
+          </a:p>
+          <a:p>
+            <a:pPr fontAlgn="base"/>
+            <a:r>
+              <a:rPr lang="en-US" dirty="0" smtClean="0"/>
+              <a:t>Stage </a:t>
+            </a:r>
+            <a:r>
+              <a:rPr lang="en-US" dirty="0"/>
+              <a:t>2 </a:t>
+            </a:r>
+          </a:p>
+          <a:p>
+            <a:pPr lvl="1" fontAlgn="base"/>
+            <a:r>
+              <a:rPr lang="en-US" sz="2400" dirty="0"/>
+              <a:t>Sensors </a:t>
+            </a:r>
+          </a:p>
+          <a:p>
+            <a:pPr lvl="1" fontAlgn="base"/>
+            <a:r>
+              <a:rPr lang="en-US" sz="2400" dirty="0" smtClean="0"/>
+              <a:t>Power </a:t>
+            </a:r>
+            <a:r>
+              <a:rPr lang="en-US" sz="2400" dirty="0"/>
+              <a:t>Source </a:t>
+            </a:r>
+          </a:p>
+          <a:p>
+            <a:pPr lvl="1" fontAlgn="base"/>
+            <a:r>
+              <a:rPr lang="en-US" sz="2400" dirty="0" err="1"/>
+              <a:t>DataHandler</a:t>
+            </a:r>
+            <a:r>
+              <a:rPr lang="en-US" sz="2400" dirty="0"/>
+              <a:t> </a:t>
+            </a:r>
+            <a:r>
+              <a:rPr lang="en-US" sz="2400" dirty="0" smtClean="0"/>
+              <a:t>Subsystem </a:t>
+            </a:r>
+            <a:r>
+              <a:rPr lang="en-US" dirty="0" smtClean="0"/>
+              <a:t> </a:t>
+            </a:r>
+            <a:r>
+              <a:rPr lang="en-US" dirty="0"/>
+              <a:t> </a:t>
+            </a:r>
+          </a:p>
+        </p:txBody>
+      </p:sp>
+    </p:spTree>
+    <p:extLst>
+      <p:ext uri="{BB962C8B-B14F-4D97-AF65-F5344CB8AC3E}">
+        <p14:creationId xmlns:p14="http://schemas.microsoft.com/office/powerpoint/2010/main" val="3242721611"/>
+      </p:ext>
+    </p:extLst>
+  </p:cSld>
+  <p:clrMapOvr>
+    <a:masterClrMapping/>
+  </p:clrMapOvr>
+  <p:timing>
+    <p:tnLst>
+      <p:par>
+        <p:cTn id="1" dur="indefinite" restart="never" nodeType="tmRoot"/>
+      </p:par>
+    </p:tnLst>
+  </p:timing>
+</p:sld>
+</file>
+
+<file path=ppt/slides/slide3.xml><?xml version="1.0" encoding="utf-8"?>
+<p:sld xmlns:a="http://schemas.openxmlformats.org/drawingml/2006/main" xmlns:r="http://schemas.openxmlformats.org/officeDocument/2006/relationships" xmlns:p="http://schemas.openxmlformats.org/presentationml/2006/main">
+  <p:cSld>
+    <p:spTree>
+      <p:nvGrpSpPr>
+        <p:cNvPr id="1" name=""/>
+        <p:cNvGrpSpPr/>
+        <p:nvPr/>
+      </p:nvGrpSpPr>
+      <p:grpSpPr>
+        <a:xfrm>
+          <a:off x="0" y="0"/>
+          <a:ext cx="0" cy="0"/>
+          <a:chOff x="0" y="0"/>
+          <a:chExt cx="0" cy="0"/>
+        </a:xfrm>
+      </p:grpSpPr>
+      <p:sp>
+        <p:nvSpPr>
+          <p:cNvPr id="2" name="Title 1"/>
+          <p:cNvSpPr>
+            <a:spLocks noGrp="1"/>
+          </p:cNvSpPr>
+          <p:nvPr>
+            <p:ph type="title"/>
+          </p:nvPr>
+        </p:nvSpPr>
+        <p:spPr/>
+        <p:txBody>
+          <a:bodyPr/>
+          <a:lstStyle/>
+          <a:p>
+            <a:r>
+              <a:rPr lang="en-US" dirty="0"/>
+              <a:t>Staged Delivery</a:t>
+            </a:r>
+          </a:p>
+        </p:txBody>
+      </p:sp>
+      <p:sp>
+        <p:nvSpPr>
+          <p:cNvPr id="3" name="Content Placeholder 2"/>
+          <p:cNvSpPr>
+            <a:spLocks noGrp="1"/>
+          </p:cNvSpPr>
+          <p:nvPr>
+            <p:ph idx="1"/>
+          </p:nvPr>
+        </p:nvSpPr>
+        <p:spPr/>
+        <p:txBody>
+          <a:bodyPr/>
+          <a:lstStyle/>
+          <a:p>
+            <a:pPr fontAlgn="base"/>
+            <a:r>
+              <a:rPr lang="en-US" dirty="0"/>
+              <a:t>Stage 3 </a:t>
+            </a:r>
+          </a:p>
+          <a:p>
+            <a:pPr lvl="1" fontAlgn="base"/>
+            <a:r>
+              <a:rPr lang="en-US" sz="2400" dirty="0"/>
+              <a:t>Storage Manager </a:t>
+            </a:r>
+            <a:r>
+              <a:rPr lang="en-US" dirty="0"/>
+              <a:t> </a:t>
+            </a:r>
+          </a:p>
+          <a:p>
+            <a:pPr lvl="1" fontAlgn="base"/>
+            <a:r>
+              <a:rPr lang="en-US" sz="2400" dirty="0" err="1"/>
+              <a:t>DataHandler</a:t>
+            </a:r>
+            <a:r>
+              <a:rPr lang="en-US" sz="2400" dirty="0"/>
+              <a:t>  Subsystem </a:t>
+            </a:r>
+            <a:endParaRPr lang="en-US" dirty="0"/>
+          </a:p>
+          <a:p>
+            <a:pPr fontAlgn="base"/>
+            <a:r>
+              <a:rPr lang="en-US" dirty="0"/>
+              <a:t>Stage 4 </a:t>
+            </a:r>
+          </a:p>
+          <a:p>
+            <a:pPr lvl="1" fontAlgn="base"/>
+            <a:r>
+              <a:rPr lang="en-US" sz="2400" dirty="0"/>
+              <a:t>Calibration </a:t>
+            </a:r>
+          </a:p>
+          <a:p>
+            <a:pPr lvl="1" fontAlgn="base"/>
+            <a:r>
+              <a:rPr lang="en-US" sz="2400" dirty="0"/>
+              <a:t>Processing of Data </a:t>
+            </a:r>
+          </a:p>
+          <a:p>
+            <a:pPr lvl="2" fontAlgn="base"/>
+            <a:r>
+              <a:rPr lang="en-US" dirty="0"/>
+              <a:t>Algorithm </a:t>
+            </a:r>
+          </a:p>
+          <a:p>
+            <a:pPr lvl="2" fontAlgn="base"/>
+            <a:r>
+              <a:rPr lang="en-US" dirty="0"/>
+              <a:t>Storing Processed Data </a:t>
+            </a:r>
+          </a:p>
+          <a:p>
+            <a:endParaRPr lang="en-US" dirty="0"/>
+          </a:p>
+        </p:txBody>
+      </p:sp>
+    </p:spTree>
+    <p:extLst>
+      <p:ext uri="{BB962C8B-B14F-4D97-AF65-F5344CB8AC3E}">
+        <p14:creationId xmlns:p14="http://schemas.microsoft.com/office/powerpoint/2010/main" val="769495751"/>
+      </p:ext>
+    </p:extLst>
+  </p:cSld>
+  <p:clrMapOvr>
+    <a:masterClrMapping/>
+  </p:clrMapOvr>
+  <p:timing>
+    <p:tnLst>
+      <p:par>
+        <p:cTn id="1" dur="indefinite" restart="never" nodeType="tmRoot"/>
+      </p:par>
+    </p:tnLst>
+  </p:timing>
+</p:sld>
+</file>
+
+<file path=ppt/slides/slide4.xml><?xml version="1.0" encoding="utf-8"?>
+<p:sld xmlns:a="http://schemas.openxmlformats.org/drawingml/2006/main" xmlns:r="http://schemas.openxmlformats.org/officeDocument/2006/relationships" xmlns:p="http://schemas.openxmlformats.org/presentationml/2006/main">
+  <p:cSld>
+    <p:spTree>
+      <p:nvGrpSpPr>
+        <p:cNvPr id="1" name=""/>
+        <p:cNvGrpSpPr/>
+        <p:nvPr/>
+      </p:nvGrpSpPr>
+      <p:grpSpPr>
+        <a:xfrm>
+          <a:off x="0" y="0"/>
+          <a:ext cx="0" cy="0"/>
+          <a:chOff x="0" y="0"/>
+          <a:chExt cx="0" cy="0"/>
+        </a:xfrm>
+      </p:grpSpPr>
+      <p:sp>
+        <p:nvSpPr>
+          <p:cNvPr id="2" name="Title 1"/>
+          <p:cNvSpPr>
+            <a:spLocks noGrp="1"/>
+          </p:cNvSpPr>
+          <p:nvPr>
+            <p:ph type="title"/>
+          </p:nvPr>
+        </p:nvSpPr>
+        <p:spPr/>
+        <p:txBody>
+          <a:bodyPr/>
+          <a:lstStyle/>
+          <a:p>
+            <a:r>
+              <a:rPr lang="en-US" dirty="0" smtClean="0"/>
+              <a:t>Staged </a:t>
+            </a:r>
+            <a:r>
+              <a:rPr lang="en-US" dirty="0"/>
+              <a:t>Delivery</a:t>
+            </a:r>
+          </a:p>
+        </p:txBody>
+      </p:sp>
+      <p:sp>
+        <p:nvSpPr>
+          <p:cNvPr id="3" name="Content Placeholder 2"/>
+          <p:cNvSpPr>
+            <a:spLocks noGrp="1"/>
+          </p:cNvSpPr>
+          <p:nvPr>
+            <p:ph idx="1"/>
+          </p:nvPr>
+        </p:nvSpPr>
+        <p:spPr/>
+        <p:txBody>
+          <a:bodyPr numCol="1">
+            <a:normAutofit/>
+          </a:bodyPr>
+          <a:lstStyle/>
+          <a:p>
+            <a:pPr fontAlgn="base"/>
+            <a:r>
+              <a:rPr lang="en-US" dirty="0"/>
+              <a:t>Stage 5 </a:t>
+            </a:r>
+          </a:p>
+          <a:p>
+            <a:pPr lvl="1" fontAlgn="base"/>
+            <a:r>
+              <a:rPr lang="en-US" sz="2400" dirty="0"/>
+              <a:t>Lights</a:t>
+            </a:r>
+            <a:r>
+              <a:rPr lang="en-US" dirty="0"/>
+              <a:t> </a:t>
+            </a:r>
+          </a:p>
+          <a:p>
+            <a:pPr lvl="1" fontAlgn="base"/>
+            <a:r>
+              <a:rPr lang="en-US" sz="2400" dirty="0" err="1"/>
+              <a:t>DataHandler</a:t>
+            </a:r>
+            <a:r>
+              <a:rPr lang="en-US" sz="2400" dirty="0"/>
+              <a:t> subsystem </a:t>
+            </a:r>
+          </a:p>
+          <a:p>
+            <a:pPr fontAlgn="base"/>
+            <a:r>
+              <a:rPr lang="en-US" dirty="0" smtClean="0"/>
+              <a:t>Stage </a:t>
+            </a:r>
+            <a:r>
+              <a:rPr lang="en-US" dirty="0"/>
+              <a:t>6 </a:t>
+            </a:r>
+          </a:p>
+          <a:p>
+            <a:pPr lvl="1" fontAlgn="base"/>
+            <a:r>
+              <a:rPr lang="en-US" sz="2400" dirty="0" err="1"/>
+              <a:t>Gui</a:t>
+            </a:r>
+            <a:r>
+              <a:rPr lang="en-US" sz="2400" dirty="0"/>
+              <a:t> </a:t>
+            </a:r>
+          </a:p>
+          <a:p>
+            <a:pPr lvl="2" fontAlgn="base"/>
+            <a:r>
+              <a:rPr lang="en-US" dirty="0"/>
+              <a:t>Display Raw Data </a:t>
+            </a:r>
+          </a:p>
+          <a:p>
+            <a:pPr fontAlgn="base"/>
+            <a:r>
+              <a:rPr lang="en-US" dirty="0" smtClean="0"/>
+              <a:t>Stage </a:t>
+            </a:r>
+            <a:r>
+              <a:rPr lang="en-US" dirty="0"/>
+              <a:t>7 </a:t>
+            </a:r>
+          </a:p>
+          <a:p>
+            <a:pPr lvl="1" fontAlgn="base"/>
+            <a:r>
+              <a:rPr lang="en-US" sz="2400" dirty="0"/>
+              <a:t>Networking </a:t>
+            </a:r>
+          </a:p>
+        </p:txBody>
+      </p:sp>
+    </p:spTree>
+    <p:extLst>
+      <p:ext uri="{BB962C8B-B14F-4D97-AF65-F5344CB8AC3E}">
+        <p14:creationId xmlns:p14="http://schemas.microsoft.com/office/powerpoint/2010/main" val="1701365845"/>
+      </p:ext>
+    </p:extLst>
+  </p:cSld>
+  <p:clrMapOvr>
+    <a:masterClrMapping/>
+  </p:clrMapOvr>
+  <p:timing>
+    <p:tnLst>
+      <p:par>
+        <p:cTn id="1" dur="indefinite" restart="never" nodeType="tmRoot"/>
+      </p:par>
+    </p:tnLst>
+  </p:timing>
+</p:sld>
+</file>
+
+<file path=ppt/slides/slide5.xml><?xml version="1.0" encoding="utf-8"?>
+<p:sld xmlns:a="http://schemas.openxmlformats.org/drawingml/2006/main" xmlns:r="http://schemas.openxmlformats.org/officeDocument/2006/relationships" xmlns:p="http://schemas.openxmlformats.org/presentationml/2006/main">
+  <p:cSld>
+    <p:spTree>
+      <p:nvGrpSpPr>
+        <p:cNvPr id="1" name=""/>
+        <p:cNvGrpSpPr/>
+        <p:nvPr/>
+      </p:nvGrpSpPr>
+      <p:grpSpPr>
+        <a:xfrm>
+          <a:off x="0" y="0"/>
+          <a:ext cx="0" cy="0"/>
+          <a:chOff x="0" y="0"/>
+          <a:chExt cx="0" cy="0"/>
+        </a:xfrm>
+      </p:grpSpPr>
+      <p:sp>
+        <p:nvSpPr>
+          <p:cNvPr id="2" name="Title 1"/>
+          <p:cNvSpPr>
+            <a:spLocks noGrp="1"/>
+          </p:cNvSpPr>
+          <p:nvPr>
+            <p:ph type="title"/>
+          </p:nvPr>
+        </p:nvSpPr>
+        <p:spPr/>
+        <p:txBody>
+          <a:bodyPr/>
+          <a:lstStyle/>
+          <a:p>
+            <a:r>
+              <a:rPr lang="en-US" dirty="0"/>
+              <a:t>Staged Delivery</a:t>
+            </a:r>
+          </a:p>
+        </p:txBody>
+      </p:sp>
+      <p:sp>
+        <p:nvSpPr>
+          <p:cNvPr id="3" name="Content Placeholder 2"/>
+          <p:cNvSpPr>
+            <a:spLocks noGrp="1"/>
+          </p:cNvSpPr>
+          <p:nvPr>
+            <p:ph idx="1"/>
+          </p:nvPr>
+        </p:nvSpPr>
+        <p:spPr/>
+        <p:txBody>
+          <a:bodyPr>
+            <a:normAutofit fontScale="92500" lnSpcReduction="20000"/>
+          </a:bodyPr>
+          <a:lstStyle/>
+          <a:p>
+            <a:pPr fontAlgn="base"/>
+            <a:r>
+              <a:rPr lang="en-US" dirty="0"/>
+              <a:t>Stage 8 </a:t>
+            </a:r>
+          </a:p>
+          <a:p>
+            <a:pPr lvl="1" fontAlgn="base"/>
+            <a:r>
+              <a:rPr lang="en-US" sz="2400" dirty="0"/>
+              <a:t>GUI </a:t>
+            </a:r>
+          </a:p>
+          <a:p>
+            <a:pPr lvl="2" fontAlgn="base"/>
+            <a:r>
+              <a:rPr lang="en-US" dirty="0"/>
+              <a:t>Shows Raw Data </a:t>
+            </a:r>
+          </a:p>
+          <a:p>
+            <a:pPr lvl="2" fontAlgn="base"/>
+            <a:r>
+              <a:rPr lang="en-US" dirty="0"/>
+              <a:t>Shows Processed Data  </a:t>
+            </a:r>
+          </a:p>
+          <a:p>
+            <a:pPr lvl="2" fontAlgn="base"/>
+            <a:r>
+              <a:rPr lang="en-US" dirty="0"/>
+              <a:t>Changes UIC </a:t>
+            </a:r>
+          </a:p>
+          <a:p>
+            <a:pPr lvl="2" fontAlgn="base"/>
+            <a:r>
+              <a:rPr lang="en-US" dirty="0"/>
+              <a:t>Calibrate option </a:t>
+            </a:r>
+          </a:p>
+          <a:p>
+            <a:pPr lvl="2" fontAlgn="base"/>
+            <a:r>
+              <a:rPr lang="en-US" dirty="0"/>
+              <a:t>Requests Stored Data </a:t>
+            </a:r>
+          </a:p>
+          <a:p>
+            <a:pPr fontAlgn="base"/>
+            <a:r>
+              <a:rPr lang="en-US" dirty="0"/>
+              <a:t>Stage 9 </a:t>
+            </a:r>
+          </a:p>
+          <a:p>
+            <a:pPr lvl="1" fontAlgn="base"/>
+            <a:r>
+              <a:rPr lang="en-US" sz="2400" dirty="0" err="1"/>
+              <a:t>Gui</a:t>
+            </a:r>
+            <a:r>
+              <a:rPr lang="en-US" sz="2400" dirty="0"/>
+              <a:t> Graph Data </a:t>
+            </a:r>
+          </a:p>
+          <a:p>
+            <a:pPr lvl="1" fontAlgn="base"/>
+            <a:r>
+              <a:rPr lang="en-US" sz="2400" dirty="0"/>
+              <a:t>GPS data </a:t>
+            </a:r>
+          </a:p>
+          <a:p>
+            <a:pPr lvl="1" fontAlgn="base"/>
+            <a:r>
+              <a:rPr lang="en-US" sz="2400" dirty="0" err="1"/>
+              <a:t>Gui</a:t>
+            </a:r>
+            <a:r>
+              <a:rPr lang="en-US" sz="2400" dirty="0"/>
+              <a:t> GPS </a:t>
+            </a:r>
+          </a:p>
+          <a:p>
+            <a:pPr lvl="1" fontAlgn="base"/>
+            <a:r>
+              <a:rPr lang="en-US" sz="2400" dirty="0"/>
+              <a:t>Removable Storage </a:t>
+            </a:r>
+          </a:p>
+          <a:p>
+            <a:endParaRPr lang="en-US" dirty="0"/>
+          </a:p>
+        </p:txBody>
+      </p:sp>
+    </p:spTree>
+    <p:extLst>
+      <p:ext uri="{BB962C8B-B14F-4D97-AF65-F5344CB8AC3E}">
+        <p14:creationId xmlns:p14="http://schemas.microsoft.com/office/powerpoint/2010/main" val="1094963687"/>
+      </p:ext>
+    </p:extLst>
+  </p:cSld>
+  <p:clrMapOvr>
+    <a:masterClrMapping/>
+  </p:clrMapOvr>
+  <p:timing>
+    <p:tnLst>
+      <p:par>
+        <p:cTn id="1" dur="indefinite" restart="never" nodeType="tmRoot"/>
+      </p:par>
+    </p:tnLst>
+  </p:timing>
+</p:sld>
+</file>
+
+<file path=ppt/slides/slide6.xml><?xml version="1.0" encoding="utf-8"?>
+<p:sld xmlns:a="http://schemas.openxmlformats.org/drawingml/2006/main" xmlns:r="http://schemas.openxmlformats.org/officeDocument/2006/relationships" xmlns:p="http://schemas.openxmlformats.org/presentationml/2006/main">
+  <p:cSld>
+    <p:spTree>
+      <p:nvGrpSpPr>
+        <p:cNvPr id="1" name=""/>
+        <p:cNvGrpSpPr/>
+        <p:nvPr/>
+      </p:nvGrpSpPr>
+      <p:grpSpPr>
+        <a:xfrm>
+          <a:off x="0" y="0"/>
+          <a:ext cx="0" cy="0"/>
+          <a:chOff x="0" y="0"/>
+          <a:chExt cx="0" cy="0"/>
+        </a:xfrm>
+      </p:grpSpPr>
+      <p:sp>
+        <p:nvSpPr>
+          <p:cNvPr id="2" name="Title 1"/>
+          <p:cNvSpPr>
+            <a:spLocks noGrp="1"/>
+          </p:cNvSpPr>
+          <p:nvPr>
+            <p:ph type="title"/>
+          </p:nvPr>
+        </p:nvSpPr>
+        <p:spPr/>
+        <p:txBody>
+          <a:bodyPr/>
+          <a:lstStyle/>
+          <a:p>
+            <a:r>
+              <a:rPr lang="en-US" dirty="0" smtClean="0"/>
+              <a:t>ADS </a:t>
+            </a:r>
+            <a:r>
+              <a:rPr lang="en-US" dirty="0" smtClean="0"/>
+              <a:t>Layers</a:t>
             </a:r>
             <a:endParaRPr lang="en-US" dirty="0"/>
           </a:p>
@@ -5479,7 +6469,7 @@
           <p:nvPr/>
         </p:nvPicPr>
         <p:blipFill>
-          <a:blip r:embed="rId2">
+          <a:blip r:embed="rId3">
             <a:extLst>
               <a:ext uri="{28A0092B-C50C-407E-A947-70E740481C1C}">
                 <a14:useLocalDpi xmlns:a14="http://schemas.microsoft.com/office/drawing/2010/main" val="0"/>
@@ -5554,6 +6544,292 @@
 </p:sld>
 </file>
 
+<file path=ppt/slides/slide7.xml><?xml version="1.0" encoding="utf-8"?>
+<p:sld xmlns:a="http://schemas.openxmlformats.org/drawingml/2006/main" xmlns:r="http://schemas.openxmlformats.org/officeDocument/2006/relationships" xmlns:p="http://schemas.openxmlformats.org/presentationml/2006/main">
+  <p:cSld>
+    <p:spTree>
+      <p:nvGrpSpPr>
+        <p:cNvPr id="1" name=""/>
+        <p:cNvGrpSpPr/>
+        <p:nvPr/>
+      </p:nvGrpSpPr>
+      <p:grpSpPr>
+        <a:xfrm>
+          <a:off x="0" y="0"/>
+          <a:ext cx="0" cy="0"/>
+          <a:chOff x="0" y="0"/>
+          <a:chExt cx="0" cy="0"/>
+        </a:xfrm>
+      </p:grpSpPr>
+      <p:sp>
+        <p:nvSpPr>
+          <p:cNvPr id="2" name="Title 1"/>
+          <p:cNvSpPr>
+            <a:spLocks noGrp="1"/>
+          </p:cNvSpPr>
+          <p:nvPr>
+            <p:ph type="title"/>
+          </p:nvPr>
+        </p:nvSpPr>
+        <p:spPr/>
+        <p:txBody>
+          <a:bodyPr/>
+          <a:lstStyle/>
+          <a:p>
+            <a:r>
+              <a:rPr lang="en-US" dirty="0" smtClean="0"/>
+              <a:t>ADS Subsystems</a:t>
+            </a:r>
+            <a:endParaRPr lang="en-US" dirty="0"/>
+          </a:p>
+        </p:txBody>
+      </p:sp>
+      <p:sp>
+        <p:nvSpPr>
+          <p:cNvPr id="3" name="Content Placeholder 2"/>
+          <p:cNvSpPr>
+            <a:spLocks noGrp="1"/>
+          </p:cNvSpPr>
+          <p:nvPr>
+            <p:ph idx="1"/>
+          </p:nvPr>
+        </p:nvSpPr>
+        <p:spPr/>
+        <p:txBody>
+          <a:bodyPr/>
+          <a:lstStyle/>
+          <a:p>
+            <a:endParaRPr lang="en-US" dirty="0"/>
+          </a:p>
+        </p:txBody>
+      </p:sp>
+      <p:pic>
+        <p:nvPicPr>
+          <p:cNvPr id="1029" name="Picture 5"/>
+          <p:cNvPicPr>
+            <a:picLocks noChangeAspect="1" noChangeArrowheads="1"/>
+          </p:cNvPicPr>
+          <p:nvPr/>
+        </p:nvPicPr>
+        <p:blipFill>
+          <a:blip r:embed="rId3">
+            <a:extLst>
+              <a:ext uri="{28A0092B-C50C-407E-A947-70E740481C1C}">
+                <a14:useLocalDpi xmlns:a14="http://schemas.microsoft.com/office/drawing/2010/main" val="0"/>
+              </a:ext>
+            </a:extLst>
+          </a:blip>
+          <a:srcRect/>
+          <a:stretch>
+            <a:fillRect/>
+          </a:stretch>
+        </p:blipFill>
+        <p:spPr bwMode="auto">
+          <a:xfrm>
+            <a:off x="838200" y="685800"/>
+            <a:ext cx="7315200" cy="4188872"/>
+          </a:xfrm>
+          <a:prstGeom prst="rect">
+            <a:avLst/>
+          </a:prstGeom>
+          <a:noFill/>
+          <a:ln>
+            <a:noFill/>
+          </a:ln>
+          <a:effectLst/>
+          <a:extLst>
+            <a:ext uri="{909E8E84-426E-40DD-AFC4-6F175D3DCCD1}">
+              <a14:hiddenFill xmlns:a14="http://schemas.microsoft.com/office/drawing/2010/main">
+                <a:solidFill>
+                  <a:schemeClr val="accent1"/>
+                </a:solidFill>
+              </a14:hiddenFill>
+            </a:ext>
+            <a:ext uri="{91240B29-F687-4F45-9708-019B960494DF}">
+              <a14:hiddenLine xmlns:a14="http://schemas.microsoft.com/office/drawing/2010/main" w="9525">
+                <a:solidFill>
+                  <a:schemeClr val="tx1"/>
+                </a:solidFill>
+                <a:miter lim="800000"/>
+                <a:headEnd/>
+                <a:tailEnd/>
+              </a14:hiddenLine>
+            </a:ext>
+            <a:ext uri="{AF507438-7753-43E0-B8FC-AC1667EBCBE1}">
+              <a14:hiddenEffects xmlns:a14="http://schemas.microsoft.com/office/drawing/2010/main">
+                <a:effectLst>
+                  <a:outerShdw dist="35921" dir="2700000" algn="ctr" rotWithShape="0">
+                    <a:schemeClr val="bg2"/>
+                  </a:outerShdw>
+                </a:effectLst>
+              </a14:hiddenEffects>
+            </a:ext>
+          </a:extLst>
+        </p:spPr>
+      </p:pic>
+    </p:spTree>
+    <p:extLst>
+      <p:ext uri="{BB962C8B-B14F-4D97-AF65-F5344CB8AC3E}">
+        <p14:creationId xmlns:p14="http://schemas.microsoft.com/office/powerpoint/2010/main" val="1988397443"/>
+      </p:ext>
+    </p:extLst>
+  </p:cSld>
+  <p:clrMapOvr>
+    <a:masterClrMapping/>
+  </p:clrMapOvr>
+  <p:timing>
+    <p:tnLst>
+      <p:par>
+        <p:cTn id="1" dur="indefinite" restart="never" nodeType="tmRoot"/>
+      </p:par>
+    </p:tnLst>
+  </p:timing>
+</p:sld>
+</file>
+
+<file path=ppt/slides/slide8.xml><?xml version="1.0" encoding="utf-8"?>
+<p:sld xmlns:a="http://schemas.openxmlformats.org/drawingml/2006/main" xmlns:r="http://schemas.openxmlformats.org/officeDocument/2006/relationships" xmlns:p="http://schemas.openxmlformats.org/presentationml/2006/main">
+  <p:cSld>
+    <p:spTree>
+      <p:nvGrpSpPr>
+        <p:cNvPr id="1" name=""/>
+        <p:cNvGrpSpPr/>
+        <p:nvPr/>
+      </p:nvGrpSpPr>
+      <p:grpSpPr>
+        <a:xfrm>
+          <a:off x="0" y="0"/>
+          <a:ext cx="0" cy="0"/>
+          <a:chOff x="0" y="0"/>
+          <a:chExt cx="0" cy="0"/>
+        </a:xfrm>
+      </p:grpSpPr>
+      <p:sp>
+        <p:nvSpPr>
+          <p:cNvPr id="2" name="Title 1"/>
+          <p:cNvSpPr>
+            <a:spLocks noGrp="1"/>
+          </p:cNvSpPr>
+          <p:nvPr>
+            <p:ph type="title"/>
+          </p:nvPr>
+        </p:nvSpPr>
+        <p:spPr/>
+        <p:txBody>
+          <a:bodyPr/>
+          <a:lstStyle/>
+          <a:p>
+            <a:r>
+              <a:rPr lang="en-US" dirty="0" smtClean="0"/>
+              <a:t>ADS Subsystems</a:t>
+            </a:r>
+            <a:endParaRPr lang="en-US" dirty="0"/>
+          </a:p>
+        </p:txBody>
+      </p:sp>
+      <p:sp>
+        <p:nvSpPr>
+          <p:cNvPr id="3" name="Content Placeholder 2"/>
+          <p:cNvSpPr>
+            <a:spLocks noGrp="1"/>
+          </p:cNvSpPr>
+          <p:nvPr>
+            <p:ph idx="1"/>
+          </p:nvPr>
+        </p:nvSpPr>
+        <p:spPr/>
+        <p:txBody>
+          <a:bodyPr/>
+          <a:lstStyle/>
+          <a:p>
+            <a:endParaRPr lang="en-US" dirty="0"/>
+          </a:p>
+        </p:txBody>
+      </p:sp>
+      <p:pic>
+        <p:nvPicPr>
+          <p:cNvPr id="1030" name="Picture 6"/>
+          <p:cNvPicPr>
+            <a:picLocks noChangeAspect="1" noChangeArrowheads="1"/>
+          </p:cNvPicPr>
+          <p:nvPr/>
+        </p:nvPicPr>
+        <p:blipFill>
+          <a:blip r:embed="rId3">
+            <a:extLst>
+              <a:ext uri="{28A0092B-C50C-407E-A947-70E740481C1C}">
+                <a14:useLocalDpi xmlns:a14="http://schemas.microsoft.com/office/drawing/2010/main" val="0"/>
+              </a:ext>
+            </a:extLst>
+          </a:blip>
+          <a:srcRect/>
+          <a:stretch>
+            <a:fillRect/>
+          </a:stretch>
+        </p:blipFill>
+        <p:spPr bwMode="auto">
+          <a:xfrm>
+            <a:off x="1371600" y="457200"/>
+            <a:ext cx="6096000" cy="4709545"/>
+          </a:xfrm>
+          <a:prstGeom prst="rect">
+            <a:avLst/>
+          </a:prstGeom>
+          <a:noFill/>
+          <a:ln>
+            <a:noFill/>
+          </a:ln>
+          <a:effectLst/>
+          <a:extLst>
+            <a:ext uri="{909E8E84-426E-40DD-AFC4-6F175D3DCCD1}">
+              <a14:hiddenFill xmlns:a14="http://schemas.microsoft.com/office/drawing/2010/main">
+                <a:solidFill>
+                  <a:schemeClr val="accent1"/>
+                </a:solidFill>
+              </a14:hiddenFill>
+            </a:ext>
+            <a:ext uri="{91240B29-F687-4F45-9708-019B960494DF}">
+              <a14:hiddenLine xmlns:a14="http://schemas.microsoft.com/office/drawing/2010/main" w="9525">
+                <a:solidFill>
+                  <a:schemeClr val="tx1"/>
+                </a:solidFill>
+                <a:miter lim="800000"/>
+                <a:headEnd/>
+                <a:tailEnd/>
+              </a14:hiddenLine>
+            </a:ext>
+            <a:ext uri="{AF507438-7753-43E0-B8FC-AC1667EBCBE1}">
+              <a14:hiddenEffects xmlns:a14="http://schemas.microsoft.com/office/drawing/2010/main">
+                <a:effectLst>
+                  <a:outerShdw dist="35921" dir="2700000" algn="ctr" rotWithShape="0">
+                    <a:schemeClr val="bg2"/>
+                  </a:outerShdw>
+                </a:effectLst>
+              </a14:hiddenEffects>
+            </a:ext>
+          </a:extLst>
+        </p:spPr>
+      </p:pic>
+    </p:spTree>
+    <p:extLst>
+      <p:ext uri="{BB962C8B-B14F-4D97-AF65-F5344CB8AC3E}">
+        <p14:creationId xmlns:p14="http://schemas.microsoft.com/office/powerpoint/2010/main" val="3152355684"/>
+      </p:ext>
+    </p:extLst>
+  </p:cSld>
+  <p:clrMapOvr>
+    <a:masterClrMapping/>
+  </p:clrMapOvr>
+  <p:timing>
+    <p:tnLst>
+      <p:par>
+        <p:cTn id="1" dur="indefinite" restart="never" nodeType="tmRoot"/>
+      </p:par>
+    </p:tnLst>
+  </p:timing>
+</p:sld>
+</file>
+
 <file path=ppt/slides/slide9.xml><?xml version="1.0" encoding="utf-8"?>
 <p:sld xmlns:a="http://schemas.openxmlformats.org/drawingml/2006/main" xmlns:r="http://schemas.openxmlformats.org/officeDocument/2006/relationships" xmlns:p="http://schemas.openxmlformats.org/presentationml/2006/main">
   <p:cSld>
@@ -5588,7 +6864,7 @@
           <a:p>
             <a:r>
               <a:rPr lang="en-US" dirty="0" smtClean="0"/>
-              <a:t>Work Progress</a:t>
+              <a:t>ADS Subsystems</a:t>
             </a:r>
             <a:endParaRPr lang="en-US" dirty="0"/>
           </a:p>
@@ -5609,23 +6885,20 @@
           <a:bodyPr/>
           <a:lstStyle/>
           <a:p>
-            <a:pPr marL="0" indent="0">
-              <a:buNone/>
-            </a:pPr>
-            <a:endParaRPr lang="en-US" dirty="0"/>
+            <a:endParaRPr lang="en-US"/>
           </a:p>
         </p:txBody>
       </p:sp>
       <p:pic>
         <p:nvPicPr>
-          <p:cNvPr id="1026" name="Picture 2" descr="C:\Users\Jelly\Documents\GitHub\SlidingProfiler\Presentations\TBGL status  8-6-2012.png"/>
+          <p:cNvPr id="2050" name="Picture 2"/>
           <p:cNvPicPr>
             <a:picLocks noChangeAspect="1" noChangeArrowheads="1"/>
           </p:cNvPicPr>
           <p:nvPr/>
         </p:nvPicPr>
         <p:blipFill>
-          <a:blip r:embed="rId2">
+          <a:blip r:embed="rId3">
             <a:extLst>
               <a:ext uri="{28A0092B-C50C-407E-A947-70E740481C1C}">
                 <a14:useLocalDpi xmlns:a14="http://schemas.microsoft.com/office/drawing/2010/main" val="0"/>
@@ -5639,20 +6912,43 @@
         </p:blipFill>
         <p:spPr bwMode="auto">
           <a:xfrm>
-            <a:off x="914400" y="381000"/>
-            <a:ext cx="7072477" cy="4953000"/>
+            <a:off x="1905000" y="533400"/>
+            <a:ext cx="4724400" cy="4556868"/>
           </a:xfrm>
           <a:prstGeom prst="rect">
             <a:avLst/>
           </a:prstGeom>
           <a:noFill/>
+          <a:ln>
+            <a:noFill/>
+          </a:ln>
+          <a:effectLst/>
           <a:extLst>
             <a:ext uri="{909E8E84-426E-40DD-AFC4-6F175D3DCCD1}">
               <a14:hiddenFill xmlns:a14="http://schemas.microsoft.com/office/drawing/2010/main">
                 <a:solidFill>
-                  <a:srgbClr val="FFFFFF"/>
+                  <a:schemeClr val="accent1"/>
                 </a:solidFill>
               </a14:hiddenFill>
+            </a:ext>
+            <a:ext uri="{91240B29-F687-4F45-9708-019B960494DF}">
+              <a14:hiddenLine xmlns:a14="http://schemas.microsoft.com/office/drawing/2010/main" w="9525">
+                <a:solidFill>
+                  <a:schemeClr val="tx1"/>
+                </a:solidFill>
+                <a:miter lim="800000"/>
+                <a:headEnd/>
+                <a:tailEnd/>
+              </a14:hiddenLine>
+            </a:ext>
+            <a:ext uri="{AF507438-7753-43E0-B8FC-AC1667EBCBE1}">
+              <a14:hiddenEffects xmlns:a14="http://schemas.microsoft.com/office/drawing/2010/main">
+                <a:effectLst>
+                  <a:outerShdw dist="35921" dir="2700000" algn="ctr" rotWithShape="0">
+                    <a:schemeClr val="bg2"/>
+                  </a:outerShdw>
+                </a:effectLst>
+              </a14:hiddenEffects>
             </a:ext>
           </a:extLst>
         </p:spPr>
@@ -5660,7 +6956,7 @@
     </p:spTree>
     <p:extLst>
       <p:ext uri="{BB962C8B-B14F-4D97-AF65-F5344CB8AC3E}">
-        <p14:creationId xmlns:p14="http://schemas.microsoft.com/office/powerpoint/2010/main" val="3532991015"/>
+        <p14:creationId xmlns:p14="http://schemas.microsoft.com/office/powerpoint/2010/main" val="1938101851"/>
       </p:ext>
     </p:extLst>
   </p:cSld>

</xml_diff>